<commit_message>
feat: adding Part2 materials
</commit_message>
<xml_diff>
--- a/Part1/Kubernetes Hands On - Part 1.pptx
+++ b/Part1/Kubernetes Hands On - Part 1.pptx
@@ -18,28 +18,23 @@
     <p:sldId id="263" r:id="rId13"/>
     <p:sldId id="264" r:id="rId14"/>
     <p:sldId id="265" r:id="rId15"/>
-    <p:sldId id="266" r:id="rId16"/>
-    <p:sldId id="267" r:id="rId17"/>
-    <p:sldId id="268" r:id="rId18"/>
-    <p:sldId id="269" r:id="rId19"/>
-    <p:sldId id="270" r:id="rId20"/>
   </p:sldIdLst>
   <p:sldSz cy="5143500" cx="9144000"/>
   <p:notesSz cx="6858000" cy="9144000"/>
   <p:embeddedFontLst>
     <p:embeddedFont>
       <p:font typeface="Roboto"/>
-      <p:regular r:id="rId21"/>
-      <p:bold r:id="rId22"/>
-      <p:italic r:id="rId23"/>
-      <p:boldItalic r:id="rId24"/>
+      <p:regular r:id="rId16"/>
+      <p:bold r:id="rId17"/>
+      <p:italic r:id="rId18"/>
+      <p:boldItalic r:id="rId19"/>
     </p:embeddedFont>
     <p:embeddedFont>
       <p:font typeface="Merriweather"/>
-      <p:regular r:id="rId25"/>
-      <p:bold r:id="rId26"/>
-      <p:italic r:id="rId27"/>
-      <p:boldItalic r:id="rId28"/>
+      <p:regular r:id="rId20"/>
+      <p:bold r:id="rId21"/>
+      <p:italic r:id="rId22"/>
+      <p:boldItalic r:id="rId23"/>
     </p:embeddedFont>
   </p:embeddedFontLst>
   <p:defaultTextStyle>
@@ -834,7 +829,7 @@
       </p:grpSpPr>
       <p:sp>
         <p:nvSpPr>
-          <p:cNvPr id="119" name="Google Shape;119;g118b3cfbcb1_0_225:notes"/>
+          <p:cNvPr id="119" name="Google Shape;119;g118b3cfbcb1_0_219:notes"/>
           <p:cNvSpPr/>
           <p:nvPr>
             <p:ph idx="2" type="sldImg"/>
@@ -869,7 +864,7 @@
       </p:sp>
       <p:sp>
         <p:nvSpPr>
-          <p:cNvPr id="120" name="Google Shape;120;g118b3cfbcb1_0_225:notes"/>
+          <p:cNvPr id="120" name="Google Shape;120;g118b3cfbcb1_0_219:notes"/>
           <p:cNvSpPr txBox="1"/>
           <p:nvPr>
             <p:ph idx="1" type="body"/>
@@ -900,502 +895,8 @@
               <a:buNone/>
             </a:pPr>
             <a:r>
-              <a:t/>
-            </a:r>
-            <a:endParaRPr/>
-          </a:p>
-        </p:txBody>
-      </p:sp>
-    </p:spTree>
-  </p:cSld>
-  <p:clrMapOvr>
-    <a:masterClrMapping/>
-  </p:clrMapOvr>
-</p:notes>
-</file>
-
-<file path=ppt/notesSlides/notesSlide11.xml><?xml version="1.0" encoding="utf-8"?>
-<p:notes xmlns:a="http://schemas.openxmlformats.org/drawingml/2006/main" xmlns:r="http://schemas.openxmlformats.org/officeDocument/2006/relationships" xmlns:mc="http://schemas.openxmlformats.org/markup-compatibility/2006" xmlns:mv="urn:schemas-microsoft-com:mac:vml" xmlns:p="http://schemas.openxmlformats.org/presentationml/2006/main" xmlns:c="http://schemas.openxmlformats.org/drawingml/2006/chart" xmlns:dgm="http://schemas.openxmlformats.org/drawingml/2006/diagram" xmlns:o="urn:schemas-microsoft-com:office:office" xmlns:v="urn:schemas-microsoft-com:vml" xmlns:pvml="urn:schemas-microsoft-com:office:powerpoint" xmlns:com="http://schemas.openxmlformats.org/drawingml/2006/compatibility" xmlns:p14="http://schemas.microsoft.com/office/powerpoint/2010/main" xmlns:p15="http://schemas.microsoft.com/office/powerpoint/2012/main" xmlns:ahyp="http://schemas.microsoft.com/office/drawing/2018/hyperlinkcolor" showMasterPhAnim="0" showMasterSp="0">
-  <p:cSld>
-    <p:spTree>
-      <p:nvGrpSpPr>
-        <p:cNvPr id="124" name="Shape 124"/>
-        <p:cNvGrpSpPr/>
-        <p:nvPr/>
-      </p:nvGrpSpPr>
-      <p:grpSpPr>
-        <a:xfrm>
-          <a:off x="0" y="0"/>
-          <a:ext cx="0" cy="0"/>
-          <a:chOff x="0" y="0"/>
-          <a:chExt cx="0" cy="0"/>
-        </a:xfrm>
-      </p:grpSpPr>
-      <p:sp>
-        <p:nvSpPr>
-          <p:cNvPr id="125" name="Google Shape;125;g118b3cfbcb1_0_230:notes"/>
-          <p:cNvSpPr/>
-          <p:nvPr>
-            <p:ph idx="2" type="sldImg"/>
-          </p:nvPr>
-        </p:nvSpPr>
-        <p:spPr>
-          <a:xfrm>
-            <a:off x="381300" y="685800"/>
-            <a:ext cx="6096000" cy="3429000"/>
-          </a:xfrm>
-          <a:custGeom>
-            <a:rect b="b" l="l" r="r" t="t"/>
-            <a:pathLst>
-              <a:path extrusionOk="0" h="120000" w="120000">
-                <a:moveTo>
-                  <a:pt x="0" y="0"/>
-                </a:moveTo>
-                <a:lnTo>
-                  <a:pt x="120000" y="0"/>
-                </a:lnTo>
-                <a:lnTo>
-                  <a:pt x="120000" y="120000"/>
-                </a:lnTo>
-                <a:lnTo>
-                  <a:pt x="0" y="120000"/>
-                </a:lnTo>
-                <a:close/>
-              </a:path>
-            </a:pathLst>
-          </a:custGeom>
-        </p:spPr>
-      </p:sp>
-      <p:sp>
-        <p:nvSpPr>
-          <p:cNvPr id="126" name="Google Shape;126;g118b3cfbcb1_0_230:notes"/>
-          <p:cNvSpPr txBox="1"/>
-          <p:nvPr>
-            <p:ph idx="1" type="body"/>
-          </p:nvPr>
-        </p:nvSpPr>
-        <p:spPr>
-          <a:xfrm>
-            <a:off x="685800" y="4343400"/>
-            <a:ext cx="5486400" cy="4114800"/>
-          </a:xfrm>
-          <a:prstGeom prst="rect">
-            <a:avLst/>
-          </a:prstGeom>
-        </p:spPr>
-        <p:txBody>
-          <a:bodyPr anchorCtr="0" anchor="t" bIns="91425" lIns="91425" spcFirstLastPara="1" rIns="91425" wrap="square" tIns="91425">
-            <a:noAutofit/>
-          </a:bodyPr>
-          <a:lstStyle/>
-          <a:p>
-            <a:pPr indent="0" lvl="0" marL="0" rtl="0" algn="l">
-              <a:spcBef>
-                <a:spcPts val="0"/>
-              </a:spcBef>
-              <a:spcAft>
-                <a:spcPts val="0"/>
-              </a:spcAft>
-              <a:buNone/>
-            </a:pPr>
-            <a:r>
-              <a:t/>
-            </a:r>
-            <a:endParaRPr/>
-          </a:p>
-        </p:txBody>
-      </p:sp>
-    </p:spTree>
-  </p:cSld>
-  <p:clrMapOvr>
-    <a:masterClrMapping/>
-  </p:clrMapOvr>
-</p:notes>
-</file>
-
-<file path=ppt/notesSlides/notesSlide12.xml><?xml version="1.0" encoding="utf-8"?>
-<p:notes xmlns:a="http://schemas.openxmlformats.org/drawingml/2006/main" xmlns:r="http://schemas.openxmlformats.org/officeDocument/2006/relationships" xmlns:mc="http://schemas.openxmlformats.org/markup-compatibility/2006" xmlns:mv="urn:schemas-microsoft-com:mac:vml" xmlns:p="http://schemas.openxmlformats.org/presentationml/2006/main" xmlns:c="http://schemas.openxmlformats.org/drawingml/2006/chart" xmlns:dgm="http://schemas.openxmlformats.org/drawingml/2006/diagram" xmlns:o="urn:schemas-microsoft-com:office:office" xmlns:v="urn:schemas-microsoft-com:vml" xmlns:pvml="urn:schemas-microsoft-com:office:powerpoint" xmlns:com="http://schemas.openxmlformats.org/drawingml/2006/compatibility" xmlns:p14="http://schemas.microsoft.com/office/powerpoint/2010/main" xmlns:p15="http://schemas.microsoft.com/office/powerpoint/2012/main" xmlns:ahyp="http://schemas.microsoft.com/office/drawing/2018/hyperlinkcolor" showMasterPhAnim="0" showMasterSp="0">
-  <p:cSld>
-    <p:spTree>
-      <p:nvGrpSpPr>
-        <p:cNvPr id="130" name="Shape 130"/>
-        <p:cNvGrpSpPr/>
-        <p:nvPr/>
-      </p:nvGrpSpPr>
-      <p:grpSpPr>
-        <a:xfrm>
-          <a:off x="0" y="0"/>
-          <a:ext cx="0" cy="0"/>
-          <a:chOff x="0" y="0"/>
-          <a:chExt cx="0" cy="0"/>
-        </a:xfrm>
-      </p:grpSpPr>
-      <p:sp>
-        <p:nvSpPr>
-          <p:cNvPr id="131" name="Google Shape;131;g118b3cfbcb1_0_235:notes"/>
-          <p:cNvSpPr/>
-          <p:nvPr>
-            <p:ph idx="2" type="sldImg"/>
-          </p:nvPr>
-        </p:nvSpPr>
-        <p:spPr>
-          <a:xfrm>
-            <a:off x="381300" y="685800"/>
-            <a:ext cx="6096000" cy="3429000"/>
-          </a:xfrm>
-          <a:custGeom>
-            <a:rect b="b" l="l" r="r" t="t"/>
-            <a:pathLst>
-              <a:path extrusionOk="0" h="120000" w="120000">
-                <a:moveTo>
-                  <a:pt x="0" y="0"/>
-                </a:moveTo>
-                <a:lnTo>
-                  <a:pt x="120000" y="0"/>
-                </a:lnTo>
-                <a:lnTo>
-                  <a:pt x="120000" y="120000"/>
-                </a:lnTo>
-                <a:lnTo>
-                  <a:pt x="0" y="120000"/>
-                </a:lnTo>
-                <a:close/>
-              </a:path>
-            </a:pathLst>
-          </a:custGeom>
-        </p:spPr>
-      </p:sp>
-      <p:sp>
-        <p:nvSpPr>
-          <p:cNvPr id="132" name="Google Shape;132;g118b3cfbcb1_0_235:notes"/>
-          <p:cNvSpPr txBox="1"/>
-          <p:nvPr>
-            <p:ph idx="1" type="body"/>
-          </p:nvPr>
-        </p:nvSpPr>
-        <p:spPr>
-          <a:xfrm>
-            <a:off x="685800" y="4343400"/>
-            <a:ext cx="5486400" cy="4114800"/>
-          </a:xfrm>
-          <a:prstGeom prst="rect">
-            <a:avLst/>
-          </a:prstGeom>
-        </p:spPr>
-        <p:txBody>
-          <a:bodyPr anchorCtr="0" anchor="t" bIns="91425" lIns="91425" spcFirstLastPara="1" rIns="91425" wrap="square" tIns="91425">
-            <a:noAutofit/>
-          </a:bodyPr>
-          <a:lstStyle/>
-          <a:p>
-            <a:pPr indent="0" lvl="0" marL="0" rtl="0" algn="l">
-              <a:spcBef>
-                <a:spcPts val="0"/>
-              </a:spcBef>
-              <a:spcAft>
-                <a:spcPts val="0"/>
-              </a:spcAft>
-              <a:buNone/>
-            </a:pPr>
-            <a:r>
-              <a:t/>
-            </a:r>
-            <a:endParaRPr/>
-          </a:p>
-        </p:txBody>
-      </p:sp>
-    </p:spTree>
-  </p:cSld>
-  <p:clrMapOvr>
-    <a:masterClrMapping/>
-  </p:clrMapOvr>
-</p:notes>
-</file>
-
-<file path=ppt/notesSlides/notesSlide13.xml><?xml version="1.0" encoding="utf-8"?>
-<p:notes xmlns:a="http://schemas.openxmlformats.org/drawingml/2006/main" xmlns:r="http://schemas.openxmlformats.org/officeDocument/2006/relationships" xmlns:mc="http://schemas.openxmlformats.org/markup-compatibility/2006" xmlns:mv="urn:schemas-microsoft-com:mac:vml" xmlns:p="http://schemas.openxmlformats.org/presentationml/2006/main" xmlns:c="http://schemas.openxmlformats.org/drawingml/2006/chart" xmlns:dgm="http://schemas.openxmlformats.org/drawingml/2006/diagram" xmlns:o="urn:schemas-microsoft-com:office:office" xmlns:v="urn:schemas-microsoft-com:vml" xmlns:pvml="urn:schemas-microsoft-com:office:powerpoint" xmlns:com="http://schemas.openxmlformats.org/drawingml/2006/compatibility" xmlns:p14="http://schemas.microsoft.com/office/powerpoint/2010/main" xmlns:p15="http://schemas.microsoft.com/office/powerpoint/2012/main" xmlns:ahyp="http://schemas.microsoft.com/office/drawing/2018/hyperlinkcolor" showMasterPhAnim="0" showMasterSp="0">
-  <p:cSld>
-    <p:spTree>
-      <p:nvGrpSpPr>
-        <p:cNvPr id="137" name="Shape 137"/>
-        <p:cNvGrpSpPr/>
-        <p:nvPr/>
-      </p:nvGrpSpPr>
-      <p:grpSpPr>
-        <a:xfrm>
-          <a:off x="0" y="0"/>
-          <a:ext cx="0" cy="0"/>
-          <a:chOff x="0" y="0"/>
-          <a:chExt cx="0" cy="0"/>
-        </a:xfrm>
-      </p:grpSpPr>
-      <p:sp>
-        <p:nvSpPr>
-          <p:cNvPr id="138" name="Google Shape;138;g118b3cfbcb1_0_244:notes"/>
-          <p:cNvSpPr/>
-          <p:nvPr>
-            <p:ph idx="2" type="sldImg"/>
-          </p:nvPr>
-        </p:nvSpPr>
-        <p:spPr>
-          <a:xfrm>
-            <a:off x="381300" y="685800"/>
-            <a:ext cx="6096000" cy="3429000"/>
-          </a:xfrm>
-          <a:custGeom>
-            <a:rect b="b" l="l" r="r" t="t"/>
-            <a:pathLst>
-              <a:path extrusionOk="0" h="120000" w="120000">
-                <a:moveTo>
-                  <a:pt x="0" y="0"/>
-                </a:moveTo>
-                <a:lnTo>
-                  <a:pt x="120000" y="0"/>
-                </a:lnTo>
-                <a:lnTo>
-                  <a:pt x="120000" y="120000"/>
-                </a:lnTo>
-                <a:lnTo>
-                  <a:pt x="0" y="120000"/>
-                </a:lnTo>
-                <a:close/>
-              </a:path>
-            </a:pathLst>
-          </a:custGeom>
-        </p:spPr>
-      </p:sp>
-      <p:sp>
-        <p:nvSpPr>
-          <p:cNvPr id="139" name="Google Shape;139;g118b3cfbcb1_0_244:notes"/>
-          <p:cNvSpPr txBox="1"/>
-          <p:nvPr>
-            <p:ph idx="1" type="body"/>
-          </p:nvPr>
-        </p:nvSpPr>
-        <p:spPr>
-          <a:xfrm>
-            <a:off x="685800" y="4343400"/>
-            <a:ext cx="5486400" cy="4114800"/>
-          </a:xfrm>
-          <a:prstGeom prst="rect">
-            <a:avLst/>
-          </a:prstGeom>
-        </p:spPr>
-        <p:txBody>
-          <a:bodyPr anchorCtr="0" anchor="t" bIns="91425" lIns="91425" spcFirstLastPara="1" rIns="91425" wrap="square" tIns="91425">
-            <a:noAutofit/>
-          </a:bodyPr>
-          <a:lstStyle/>
-          <a:p>
-            <a:pPr indent="0" lvl="0" marL="0" rtl="0" algn="l">
-              <a:spcBef>
-                <a:spcPts val="0"/>
-              </a:spcBef>
-              <a:spcAft>
-                <a:spcPts val="0"/>
-              </a:spcAft>
-              <a:buNone/>
-            </a:pPr>
-            <a:r>
-              <a:t/>
-            </a:r>
-            <a:endParaRPr/>
-          </a:p>
-        </p:txBody>
-      </p:sp>
-    </p:spTree>
-  </p:cSld>
-  <p:clrMapOvr>
-    <a:masterClrMapping/>
-  </p:clrMapOvr>
-</p:notes>
-</file>
-
-<file path=ppt/notesSlides/notesSlide14.xml><?xml version="1.0" encoding="utf-8"?>
-<p:notes xmlns:a="http://schemas.openxmlformats.org/drawingml/2006/main" xmlns:r="http://schemas.openxmlformats.org/officeDocument/2006/relationships" xmlns:mc="http://schemas.openxmlformats.org/markup-compatibility/2006" xmlns:mv="urn:schemas-microsoft-com:mac:vml" xmlns:p="http://schemas.openxmlformats.org/presentationml/2006/main" xmlns:c="http://schemas.openxmlformats.org/drawingml/2006/chart" xmlns:dgm="http://schemas.openxmlformats.org/drawingml/2006/diagram" xmlns:o="urn:schemas-microsoft-com:office:office" xmlns:v="urn:schemas-microsoft-com:vml" xmlns:pvml="urn:schemas-microsoft-com:office:powerpoint" xmlns:com="http://schemas.openxmlformats.org/drawingml/2006/compatibility" xmlns:p14="http://schemas.microsoft.com/office/powerpoint/2010/main" xmlns:p15="http://schemas.microsoft.com/office/powerpoint/2012/main" xmlns:ahyp="http://schemas.microsoft.com/office/drawing/2018/hyperlinkcolor" showMasterPhAnim="0" showMasterSp="0">
-  <p:cSld>
-    <p:spTree>
-      <p:nvGrpSpPr>
-        <p:cNvPr id="143" name="Shape 143"/>
-        <p:cNvGrpSpPr/>
-        <p:nvPr/>
-      </p:nvGrpSpPr>
-      <p:grpSpPr>
-        <a:xfrm>
-          <a:off x="0" y="0"/>
-          <a:ext cx="0" cy="0"/>
-          <a:chOff x="0" y="0"/>
-          <a:chExt cx="0" cy="0"/>
-        </a:xfrm>
-      </p:grpSpPr>
-      <p:sp>
-        <p:nvSpPr>
-          <p:cNvPr id="144" name="Google Shape;144;g118b3cfbcb1_0_249:notes"/>
-          <p:cNvSpPr/>
-          <p:nvPr>
-            <p:ph idx="2" type="sldImg"/>
-          </p:nvPr>
-        </p:nvSpPr>
-        <p:spPr>
-          <a:xfrm>
-            <a:off x="381300" y="685800"/>
-            <a:ext cx="6096000" cy="3429000"/>
-          </a:xfrm>
-          <a:custGeom>
-            <a:rect b="b" l="l" r="r" t="t"/>
-            <a:pathLst>
-              <a:path extrusionOk="0" h="120000" w="120000">
-                <a:moveTo>
-                  <a:pt x="0" y="0"/>
-                </a:moveTo>
-                <a:lnTo>
-                  <a:pt x="120000" y="0"/>
-                </a:lnTo>
-                <a:lnTo>
-                  <a:pt x="120000" y="120000"/>
-                </a:lnTo>
-                <a:lnTo>
-                  <a:pt x="0" y="120000"/>
-                </a:lnTo>
-                <a:close/>
-              </a:path>
-            </a:pathLst>
-          </a:custGeom>
-        </p:spPr>
-      </p:sp>
-      <p:sp>
-        <p:nvSpPr>
-          <p:cNvPr id="145" name="Google Shape;145;g118b3cfbcb1_0_249:notes"/>
-          <p:cNvSpPr txBox="1"/>
-          <p:nvPr>
-            <p:ph idx="1" type="body"/>
-          </p:nvPr>
-        </p:nvSpPr>
-        <p:spPr>
-          <a:xfrm>
-            <a:off x="685800" y="4343400"/>
-            <a:ext cx="5486400" cy="4114800"/>
-          </a:xfrm>
-          <a:prstGeom prst="rect">
-            <a:avLst/>
-          </a:prstGeom>
-        </p:spPr>
-        <p:txBody>
-          <a:bodyPr anchorCtr="0" anchor="t" bIns="91425" lIns="91425" spcFirstLastPara="1" rIns="91425" wrap="square" tIns="91425">
-            <a:noAutofit/>
-          </a:bodyPr>
-          <a:lstStyle/>
-          <a:p>
-            <a:pPr indent="0" lvl="0" marL="0" rtl="0" algn="l">
-              <a:spcBef>
-                <a:spcPts val="0"/>
-              </a:spcBef>
-              <a:spcAft>
-                <a:spcPts val="0"/>
-              </a:spcAft>
-              <a:buNone/>
-            </a:pPr>
-            <a:r>
-              <a:t/>
-            </a:r>
-            <a:endParaRPr/>
-          </a:p>
-        </p:txBody>
-      </p:sp>
-    </p:spTree>
-  </p:cSld>
-  <p:clrMapOvr>
-    <a:masterClrMapping/>
-  </p:clrMapOvr>
-</p:notes>
-</file>
-
-<file path=ppt/notesSlides/notesSlide15.xml><?xml version="1.0" encoding="utf-8"?>
-<p:notes xmlns:a="http://schemas.openxmlformats.org/drawingml/2006/main" xmlns:r="http://schemas.openxmlformats.org/officeDocument/2006/relationships" xmlns:mc="http://schemas.openxmlformats.org/markup-compatibility/2006" xmlns:mv="urn:schemas-microsoft-com:mac:vml" xmlns:p="http://schemas.openxmlformats.org/presentationml/2006/main" xmlns:c="http://schemas.openxmlformats.org/drawingml/2006/chart" xmlns:dgm="http://schemas.openxmlformats.org/drawingml/2006/diagram" xmlns:o="urn:schemas-microsoft-com:office:office" xmlns:v="urn:schemas-microsoft-com:vml" xmlns:pvml="urn:schemas-microsoft-com:office:powerpoint" xmlns:com="http://schemas.openxmlformats.org/drawingml/2006/compatibility" xmlns:p14="http://schemas.microsoft.com/office/powerpoint/2010/main" xmlns:p15="http://schemas.microsoft.com/office/powerpoint/2012/main" xmlns:ahyp="http://schemas.microsoft.com/office/drawing/2018/hyperlinkcolor" showMasterPhAnim="0" showMasterSp="0">
-  <p:cSld>
-    <p:spTree>
-      <p:nvGrpSpPr>
-        <p:cNvPr id="150" name="Shape 150"/>
-        <p:cNvGrpSpPr/>
-        <p:nvPr/>
-      </p:nvGrpSpPr>
-      <p:grpSpPr>
-        <a:xfrm>
-          <a:off x="0" y="0"/>
-          <a:ext cx="0" cy="0"/>
-          <a:chOff x="0" y="0"/>
-          <a:chExt cx="0" cy="0"/>
-        </a:xfrm>
-      </p:grpSpPr>
-      <p:sp>
-        <p:nvSpPr>
-          <p:cNvPr id="151" name="Google Shape;151;g118b3cfbcb1_0_255:notes"/>
-          <p:cNvSpPr/>
-          <p:nvPr>
-            <p:ph idx="2" type="sldImg"/>
-          </p:nvPr>
-        </p:nvSpPr>
-        <p:spPr>
-          <a:xfrm>
-            <a:off x="381300" y="685800"/>
-            <a:ext cx="6096000" cy="3429000"/>
-          </a:xfrm>
-          <a:custGeom>
-            <a:rect b="b" l="l" r="r" t="t"/>
-            <a:pathLst>
-              <a:path extrusionOk="0" h="120000" w="120000">
-                <a:moveTo>
-                  <a:pt x="0" y="0"/>
-                </a:moveTo>
-                <a:lnTo>
-                  <a:pt x="120000" y="0"/>
-                </a:lnTo>
-                <a:lnTo>
-                  <a:pt x="120000" y="120000"/>
-                </a:lnTo>
-                <a:lnTo>
-                  <a:pt x="0" y="120000"/>
-                </a:lnTo>
-                <a:close/>
-              </a:path>
-            </a:pathLst>
-          </a:custGeom>
-        </p:spPr>
-      </p:sp>
-      <p:sp>
-        <p:nvSpPr>
-          <p:cNvPr id="152" name="Google Shape;152;g118b3cfbcb1_0_255:notes"/>
-          <p:cNvSpPr txBox="1"/>
-          <p:nvPr>
-            <p:ph idx="1" type="body"/>
-          </p:nvPr>
-        </p:nvSpPr>
-        <p:spPr>
-          <a:xfrm>
-            <a:off x="685800" y="4343400"/>
-            <a:ext cx="5486400" cy="4114800"/>
-          </a:xfrm>
-          <a:prstGeom prst="rect">
-            <a:avLst/>
-          </a:prstGeom>
-        </p:spPr>
-        <p:txBody>
-          <a:bodyPr anchorCtr="0" anchor="t" bIns="91425" lIns="91425" spcFirstLastPara="1" rIns="91425" wrap="square" tIns="91425">
-            <a:noAutofit/>
-          </a:bodyPr>
-          <a:lstStyle/>
-          <a:p>
-            <a:pPr indent="0" lvl="0" marL="0" rtl="0" algn="l">
-              <a:spcBef>
-                <a:spcPts val="0"/>
-              </a:spcBef>
-              <a:spcAft>
-                <a:spcPts val="0"/>
-              </a:spcAft>
-              <a:buNone/>
-            </a:pPr>
-            <a:r>
-              <a:t/>
+              <a:rPr lang="en"/>
+              <a:t>Need a docker hub account</a:t>
             </a:r>
             <a:endParaRPr/>
           </a:p>
@@ -1594,11 +1095,7 @@
             </a:pPr>
             <a:r>
               <a:rPr lang="en"/>
-              <a:t>Users on a </a:t>
-            </a:r>
-            <a:r>
-              <a:rPr lang="en"/>
-              <a:t>system - Isolation</a:t>
+              <a:t>Users on a system - Isolation</a:t>
             </a:r>
             <a:endParaRPr/>
           </a:p>
@@ -2164,7 +1661,7 @@
       </p:grpSpPr>
       <p:sp>
         <p:nvSpPr>
-          <p:cNvPr id="113" name="Google Shape;113;g118b3cfbcb1_0_219:notes"/>
+          <p:cNvPr id="113" name="Google Shape;113;g118b3cfbcb1_0_225:notes"/>
           <p:cNvSpPr/>
           <p:nvPr>
             <p:ph idx="2" type="sldImg"/>
@@ -2199,7 +1696,7 @@
       </p:sp>
       <p:sp>
         <p:nvSpPr>
-          <p:cNvPr id="114" name="Google Shape;114;g118b3cfbcb1_0_219:notes"/>
+          <p:cNvPr id="114" name="Google Shape;114;g118b3cfbcb1_0_225:notes"/>
           <p:cNvSpPr txBox="1"/>
           <p:nvPr>
             <p:ph idx="1" type="body"/>
@@ -2230,8 +1727,7 @@
               <a:buNone/>
             </a:pPr>
             <a:r>
-              <a:rPr lang="en"/>
-              <a:t>Need a docker hub account</a:t>
+              <a:t/>
             </a:r>
             <a:endParaRPr/>
           </a:p>
@@ -8436,99 +7932,6 @@
             </a:pPr>
             <a:r>
               <a:rPr lang="en"/>
-              <a:t>Docker Swarm</a:t>
-            </a:r>
-            <a:endParaRPr/>
-          </a:p>
-        </p:txBody>
-      </p:sp>
-      <p:pic>
-        <p:nvPicPr>
-          <p:cNvPr id="123" name="Google Shape;123;p22"/>
-          <p:cNvPicPr preferRelativeResize="0"/>
-          <p:nvPr/>
-        </p:nvPicPr>
-        <p:blipFill>
-          <a:blip r:embed="rId3">
-            <a:alphaModFix/>
-          </a:blip>
-          <a:stretch>
-            <a:fillRect/>
-          </a:stretch>
-        </p:blipFill>
-        <p:spPr>
-          <a:xfrm>
-            <a:off x="685800" y="1353225"/>
-            <a:ext cx="7920298" cy="3714075"/>
-          </a:xfrm>
-          <a:prstGeom prst="rect">
-            <a:avLst/>
-          </a:prstGeom>
-          <a:noFill/>
-          <a:ln>
-            <a:noFill/>
-          </a:ln>
-        </p:spPr>
-      </p:pic>
-    </p:spTree>
-  </p:cSld>
-  <p:clrMapOvr>
-    <a:masterClrMapping/>
-  </p:clrMapOvr>
-</p:sld>
-</file>
-
-<file path=ppt/slides/slide11.xml><?xml version="1.0" encoding="utf-8"?>
-<p:sld xmlns:a="http://schemas.openxmlformats.org/drawingml/2006/main" xmlns:r="http://schemas.openxmlformats.org/officeDocument/2006/relationships" xmlns:mc="http://schemas.openxmlformats.org/markup-compatibility/2006" xmlns:mv="urn:schemas-microsoft-com:mac:vml" xmlns:p="http://schemas.openxmlformats.org/presentationml/2006/main" xmlns:c="http://schemas.openxmlformats.org/drawingml/2006/chart" xmlns:dgm="http://schemas.openxmlformats.org/drawingml/2006/diagram" xmlns:o="urn:schemas-microsoft-com:office:office" xmlns:v="urn:schemas-microsoft-com:vml" xmlns:pvml="urn:schemas-microsoft-com:office:powerpoint" xmlns:com="http://schemas.openxmlformats.org/drawingml/2006/compatibility" xmlns:p14="http://schemas.microsoft.com/office/powerpoint/2010/main" xmlns:p15="http://schemas.microsoft.com/office/powerpoint/2012/main" xmlns:ahyp="http://schemas.microsoft.com/office/drawing/2018/hyperlinkcolor">
-  <p:cSld>
-    <p:spTree>
-      <p:nvGrpSpPr>
-        <p:cNvPr id="127" name="Shape 127"/>
-        <p:cNvGrpSpPr/>
-        <p:nvPr/>
-      </p:nvGrpSpPr>
-      <p:grpSpPr>
-        <a:xfrm>
-          <a:off x="0" y="0"/>
-          <a:ext cx="0" cy="0"/>
-          <a:chOff x="0" y="0"/>
-          <a:chExt cx="0" cy="0"/>
-        </a:xfrm>
-      </p:grpSpPr>
-      <p:sp>
-        <p:nvSpPr>
-          <p:cNvPr id="128" name="Google Shape;128;p23"/>
-          <p:cNvSpPr txBox="1"/>
-          <p:nvPr>
-            <p:ph type="title"/>
-          </p:nvPr>
-        </p:nvSpPr>
-        <p:spPr>
-          <a:xfrm>
-            <a:off x="311725" y="500925"/>
-            <a:ext cx="8520600" cy="623700"/>
-          </a:xfrm>
-          <a:prstGeom prst="rect">
-            <a:avLst/>
-          </a:prstGeom>
-        </p:spPr>
-        <p:txBody>
-          <a:bodyPr anchorCtr="0" anchor="t" bIns="91425" lIns="91425" spcFirstLastPara="1" rIns="91425" wrap="square" tIns="91425">
-            <a:normAutofit/>
-          </a:bodyPr>
-          <a:lstStyle/>
-          <a:p>
-            <a:pPr indent="0" lvl="0" marL="0" rtl="0" algn="l">
-              <a:spcBef>
-                <a:spcPts val="0"/>
-              </a:spcBef>
-              <a:spcAft>
-                <a:spcPts val="0"/>
-              </a:spcAft>
-              <a:buNone/>
-            </a:pPr>
-            <a:r>
-              <a:rPr lang="en"/>
               <a:t>Hands On</a:t>
             </a:r>
             <a:endParaRPr/>
@@ -8537,14 +7940,14 @@
       </p:sp>
       <p:sp>
         <p:nvSpPr>
-          <p:cNvPr id="129" name="Google Shape;129;p23"/>
+          <p:cNvPr id="123" name="Google Shape;123;p22"/>
           <p:cNvSpPr txBox="1"/>
           <p:nvPr/>
         </p:nvSpPr>
         <p:spPr>
           <a:xfrm>
-            <a:off x="435350" y="1432925"/>
-            <a:ext cx="8397000" cy="2955300"/>
+            <a:off x="343800" y="2321825"/>
+            <a:ext cx="8376300" cy="1262100"/>
           </a:xfrm>
           <a:prstGeom prst="rect">
             <a:avLst/>
@@ -8560,1657 +7963,68 @@
           </a:bodyPr>
           <a:lstStyle/>
           <a:p>
-            <a:pPr indent="-323850" lvl="0" marL="457200" rtl="0" algn="l">
-              <a:spcBef>
-                <a:spcPts val="0"/>
-              </a:spcBef>
-              <a:spcAft>
-                <a:spcPts val="0"/>
-              </a:spcAft>
-              <a:buClr>
-                <a:srgbClr val="4C4C51"/>
-              </a:buClr>
-              <a:buSzPts val="1500"/>
-              <a:buChar char="➔"/>
+            <a:pPr indent="0" lvl="0" marL="0" rtl="0" algn="ctr">
+              <a:spcBef>
+                <a:spcPts val="0"/>
+              </a:spcBef>
+              <a:spcAft>
+                <a:spcPts val="0"/>
+              </a:spcAft>
+              <a:buNone/>
             </a:pPr>
             <a:r>
-              <a:rPr lang="en" sz="1500">
-                <a:solidFill>
-                  <a:srgbClr val="4C4C51"/>
-                </a:solidFill>
+              <a:rPr lang="en"/>
+              <a:t>Part 1 Hands on exercise</a:t>
+            </a:r>
+            <a:endParaRPr/>
+          </a:p>
+          <a:p>
+            <a:pPr indent="0" lvl="0" marL="0" rtl="0" algn="ctr">
+              <a:spcBef>
+                <a:spcPts val="0"/>
+              </a:spcBef>
+              <a:spcAft>
+                <a:spcPts val="0"/>
+              </a:spcAft>
+              <a:buNone/>
+            </a:pPr>
+            <a:r>
+              <a:t/>
+            </a:r>
+            <a:endParaRPr/>
+          </a:p>
+          <a:p>
+            <a:pPr indent="457200" lvl="0" marL="0" rtl="0" algn="ctr">
+              <a:spcBef>
+                <a:spcPts val="0"/>
+              </a:spcBef>
+              <a:spcAft>
+                <a:spcPts val="0"/>
+              </a:spcAft>
+              <a:buNone/>
+            </a:pPr>
+            <a:r>
+              <a:rPr lang="en" u="sng">
+                <a:solidFill>
+                  <a:schemeClr val="hlink"/>
+                </a:solidFill>
+                <a:latin typeface="Roboto"/>
+                <a:ea typeface="Roboto"/>
+                <a:cs typeface="Roboto"/>
+                <a:sym typeface="Roboto"/>
+                <a:hlinkClick r:id="rId3"/>
               </a:rPr>
-              <a:t>Creating Docker Swarm</a:t>
+              <a:t>https://github.com/keshavprasadms/kubernetes-training/blob/main/Part1/part1-commands.md</a:t>
             </a:r>
-            <a:endParaRPr sz="1500">
-              <a:solidFill>
-                <a:srgbClr val="4C4C51"/>
-              </a:solidFill>
+            <a:endParaRPr>
+              <a:latin typeface="Roboto"/>
+              <a:ea typeface="Roboto"/>
+              <a:cs typeface="Roboto"/>
+              <a:sym typeface="Roboto"/>
             </a:endParaRPr>
           </a:p>
           <a:p>
-            <a:pPr indent="-323850" lvl="0" marL="457200" rtl="0" algn="l">
-              <a:spcBef>
-                <a:spcPts val="0"/>
-              </a:spcBef>
-              <a:spcAft>
-                <a:spcPts val="0"/>
-              </a:spcAft>
-              <a:buClr>
-                <a:srgbClr val="4C4C51"/>
-              </a:buClr>
-              <a:buSzPts val="1500"/>
-              <a:buChar char="➔"/>
-            </a:pPr>
-            <a:r>
-              <a:rPr lang="en" sz="1500">
-                <a:solidFill>
-                  <a:srgbClr val="4C4C51"/>
-                </a:solidFill>
-              </a:rPr>
-              <a:t>Running and Accessing Swarm Services</a:t>
-            </a:r>
-            <a:endParaRPr sz="1500">
-              <a:solidFill>
-                <a:srgbClr val="4C4C51"/>
-              </a:solidFill>
-            </a:endParaRPr>
-          </a:p>
-          <a:p>
-            <a:pPr indent="-323850" lvl="0" marL="457200" rtl="0" algn="l">
-              <a:spcBef>
-                <a:spcPts val="0"/>
-              </a:spcBef>
-              <a:spcAft>
-                <a:spcPts val="0"/>
-              </a:spcAft>
-              <a:buClr>
-                <a:srgbClr val="4C4C51"/>
-              </a:buClr>
-              <a:buSzPts val="1500"/>
-              <a:buChar char="➔"/>
-            </a:pPr>
-            <a:r>
-              <a:rPr lang="en" sz="1500">
-                <a:solidFill>
-                  <a:srgbClr val="4C4C51"/>
-                </a:solidFill>
-              </a:rPr>
-              <a:t>Viewing Docker Service Information</a:t>
-            </a:r>
-            <a:endParaRPr sz="1500">
-              <a:solidFill>
-                <a:srgbClr val="4C4C51"/>
-              </a:solidFill>
-            </a:endParaRPr>
-          </a:p>
-          <a:p>
-            <a:pPr indent="-323850" lvl="0" marL="457200" rtl="0" algn="l">
-              <a:spcBef>
-                <a:spcPts val="0"/>
-              </a:spcBef>
-              <a:spcAft>
-                <a:spcPts val="0"/>
-              </a:spcAft>
-              <a:buClr>
-                <a:srgbClr val="4C4C51"/>
-              </a:buClr>
-              <a:buSzPts val="1500"/>
-              <a:buChar char="➔"/>
-            </a:pPr>
-            <a:r>
-              <a:rPr lang="en" sz="1500">
-                <a:solidFill>
-                  <a:srgbClr val="4C4C51"/>
-                </a:solidFill>
-              </a:rPr>
-              <a:t>Inspecting </a:t>
-            </a:r>
-            <a:r>
-              <a:rPr lang="en" sz="1500">
-                <a:solidFill>
-                  <a:srgbClr val="4C4C51"/>
-                </a:solidFill>
-              </a:rPr>
-              <a:t>Docker</a:t>
-            </a:r>
-            <a:r>
-              <a:rPr lang="en" sz="1500">
-                <a:solidFill>
-                  <a:srgbClr val="4C4C51"/>
-                </a:solidFill>
-              </a:rPr>
-              <a:t> Service Logs</a:t>
-            </a:r>
-            <a:endParaRPr sz="1500">
-              <a:solidFill>
-                <a:srgbClr val="4C4C51"/>
-              </a:solidFill>
-            </a:endParaRPr>
-          </a:p>
-          <a:p>
-            <a:pPr indent="-323850" lvl="0" marL="457200" rtl="0" algn="l">
-              <a:spcBef>
-                <a:spcPts val="0"/>
-              </a:spcBef>
-              <a:spcAft>
-                <a:spcPts val="0"/>
-              </a:spcAft>
-              <a:buClr>
-                <a:srgbClr val="4C4C51"/>
-              </a:buClr>
-              <a:buSzPts val="1500"/>
-              <a:buChar char="➔"/>
-            </a:pPr>
-            <a:r>
-              <a:rPr lang="en" sz="1500">
-                <a:solidFill>
-                  <a:srgbClr val="4C4C51"/>
-                </a:solidFill>
-              </a:rPr>
-              <a:t>Scaling </a:t>
-            </a:r>
-            <a:r>
-              <a:rPr lang="en" sz="1500">
-                <a:solidFill>
-                  <a:srgbClr val="4C4C51"/>
-                </a:solidFill>
-              </a:rPr>
-              <a:t>Docker Services</a:t>
-            </a:r>
-            <a:endParaRPr sz="1500">
-              <a:solidFill>
-                <a:srgbClr val="4C4C51"/>
-              </a:solidFill>
-            </a:endParaRPr>
-          </a:p>
-          <a:p>
-            <a:pPr indent="-323850" lvl="0" marL="457200" rtl="0" algn="l">
-              <a:spcBef>
-                <a:spcPts val="0"/>
-              </a:spcBef>
-              <a:spcAft>
-                <a:spcPts val="0"/>
-              </a:spcAft>
-              <a:buClr>
-                <a:srgbClr val="4C4C51"/>
-              </a:buClr>
-              <a:buSzPts val="1500"/>
-              <a:buChar char="➔"/>
-            </a:pPr>
-            <a:r>
-              <a:rPr lang="en" sz="1500">
-                <a:solidFill>
-                  <a:srgbClr val="4C4C51"/>
-                </a:solidFill>
-              </a:rPr>
-              <a:t>Inter Service Communication</a:t>
-            </a:r>
-            <a:endParaRPr sz="1500">
-              <a:solidFill>
-                <a:srgbClr val="4C4C51"/>
-              </a:solidFill>
-            </a:endParaRPr>
-          </a:p>
-          <a:p>
-            <a:pPr indent="-323850" lvl="0" marL="457200" rtl="0" algn="l">
-              <a:spcBef>
-                <a:spcPts val="0"/>
-              </a:spcBef>
-              <a:spcAft>
-                <a:spcPts val="0"/>
-              </a:spcAft>
-              <a:buClr>
-                <a:srgbClr val="4C4C51"/>
-              </a:buClr>
-              <a:buSzPts val="1500"/>
-              <a:buChar char="➔"/>
-            </a:pPr>
-            <a:r>
-              <a:rPr lang="en" sz="1500">
-                <a:solidFill>
-                  <a:srgbClr val="4C4C51"/>
-                </a:solidFill>
-              </a:rPr>
-              <a:t>Persisting Docker Service Data</a:t>
-            </a:r>
-            <a:endParaRPr sz="1500">
-              <a:solidFill>
-                <a:srgbClr val="4C4C51"/>
-              </a:solidFill>
-            </a:endParaRPr>
-          </a:p>
-          <a:p>
-            <a:pPr indent="-323850" lvl="0" marL="457200" rtl="0" algn="l">
-              <a:spcBef>
-                <a:spcPts val="0"/>
-              </a:spcBef>
-              <a:spcAft>
-                <a:spcPts val="0"/>
-              </a:spcAft>
-              <a:buClr>
-                <a:srgbClr val="4C4C51"/>
-              </a:buClr>
-              <a:buSzPts val="1500"/>
-              <a:buChar char="➔"/>
-            </a:pPr>
-            <a:r>
-              <a:rPr lang="en" sz="1500">
-                <a:solidFill>
-                  <a:srgbClr val="4C4C51"/>
-                </a:solidFill>
-              </a:rPr>
-              <a:t>Restricting Resources and Metrics for Docker Services</a:t>
-            </a:r>
-            <a:endParaRPr sz="1500">
-              <a:solidFill>
-                <a:srgbClr val="4C4C51"/>
-              </a:solidFill>
-            </a:endParaRPr>
-          </a:p>
-          <a:p>
-            <a:pPr indent="-323850" lvl="0" marL="457200" rtl="0" algn="l">
-              <a:spcBef>
-                <a:spcPts val="0"/>
-              </a:spcBef>
-              <a:spcAft>
-                <a:spcPts val="0"/>
-              </a:spcAft>
-              <a:buClr>
-                <a:srgbClr val="4C4C51"/>
-              </a:buClr>
-              <a:buSzPts val="1500"/>
-              <a:buChar char="➔"/>
-            </a:pPr>
-            <a:r>
-              <a:rPr lang="en" sz="1500">
-                <a:solidFill>
-                  <a:srgbClr val="4C4C51"/>
-                </a:solidFill>
-              </a:rPr>
-              <a:t>Rollback Service</a:t>
-            </a:r>
-            <a:endParaRPr sz="1500">
-              <a:solidFill>
-                <a:srgbClr val="4C4C51"/>
-              </a:solidFill>
-            </a:endParaRPr>
-          </a:p>
-          <a:p>
-            <a:pPr indent="-323850" lvl="0" marL="457200" rtl="0" algn="l">
-              <a:spcBef>
-                <a:spcPts val="0"/>
-              </a:spcBef>
-              <a:spcAft>
-                <a:spcPts val="0"/>
-              </a:spcAft>
-              <a:buClr>
-                <a:srgbClr val="4C4C51"/>
-              </a:buClr>
-              <a:buSzPts val="1500"/>
-              <a:buChar char="➔"/>
-            </a:pPr>
-            <a:r>
-              <a:rPr lang="en" sz="1500">
-                <a:solidFill>
-                  <a:srgbClr val="4C4C51"/>
-                </a:solidFill>
-              </a:rPr>
-              <a:t>Docker Config, Environment Variables and Files</a:t>
-            </a:r>
-            <a:endParaRPr sz="1500">
-              <a:solidFill>
-                <a:srgbClr val="4C4C51"/>
-              </a:solidFill>
-            </a:endParaRPr>
-          </a:p>
-          <a:p>
-            <a:pPr indent="-323850" lvl="0" marL="457200" rtl="0" algn="l">
-              <a:spcBef>
-                <a:spcPts val="0"/>
-              </a:spcBef>
-              <a:spcAft>
-                <a:spcPts val="0"/>
-              </a:spcAft>
-              <a:buClr>
-                <a:srgbClr val="4C4C51"/>
-              </a:buClr>
-              <a:buSzPts val="1500"/>
-              <a:buChar char="➔"/>
-            </a:pPr>
-            <a:r>
-              <a:rPr lang="en" sz="1500">
-                <a:solidFill>
-                  <a:srgbClr val="4C4C51"/>
-                </a:solidFill>
-              </a:rPr>
-              <a:t>Docker Compose File</a:t>
-            </a:r>
-            <a:endParaRPr sz="1500">
-              <a:solidFill>
-                <a:srgbClr val="4C4C51"/>
-              </a:solidFill>
-            </a:endParaRPr>
-          </a:p>
-          <a:p>
-            <a:pPr indent="-323850" lvl="0" marL="457200" rtl="0" algn="l">
-              <a:spcBef>
-                <a:spcPts val="0"/>
-              </a:spcBef>
-              <a:spcAft>
-                <a:spcPts val="0"/>
-              </a:spcAft>
-              <a:buClr>
-                <a:srgbClr val="4C4C51"/>
-              </a:buClr>
-              <a:buSzPts val="1500"/>
-              <a:buChar char="➔"/>
-            </a:pPr>
-            <a:r>
-              <a:rPr lang="en" sz="1500">
-                <a:solidFill>
-                  <a:srgbClr val="4C4C51"/>
-                </a:solidFill>
-              </a:rPr>
-              <a:t>Docker Stack File</a:t>
-            </a:r>
-            <a:endParaRPr sz="1500">
-              <a:solidFill>
-                <a:srgbClr val="4C4C51"/>
-              </a:solidFill>
-            </a:endParaRPr>
-          </a:p>
-        </p:txBody>
-      </p:sp>
-    </p:spTree>
-  </p:cSld>
-  <p:clrMapOvr>
-    <a:masterClrMapping/>
-  </p:clrMapOvr>
-</p:sld>
-</file>
-
-<file path=ppt/slides/slide12.xml><?xml version="1.0" encoding="utf-8"?>
-<p:sld xmlns:a="http://schemas.openxmlformats.org/drawingml/2006/main" xmlns:r="http://schemas.openxmlformats.org/officeDocument/2006/relationships" xmlns:mc="http://schemas.openxmlformats.org/markup-compatibility/2006" xmlns:mv="urn:schemas-microsoft-com:mac:vml" xmlns:p="http://schemas.openxmlformats.org/presentationml/2006/main" xmlns:c="http://schemas.openxmlformats.org/drawingml/2006/chart" xmlns:dgm="http://schemas.openxmlformats.org/drawingml/2006/diagram" xmlns:o="urn:schemas-microsoft-com:office:office" xmlns:v="urn:schemas-microsoft-com:vml" xmlns:pvml="urn:schemas-microsoft-com:office:powerpoint" xmlns:com="http://schemas.openxmlformats.org/drawingml/2006/compatibility" xmlns:p14="http://schemas.microsoft.com/office/powerpoint/2010/main" xmlns:p15="http://schemas.microsoft.com/office/powerpoint/2012/main" xmlns:ahyp="http://schemas.microsoft.com/office/drawing/2018/hyperlinkcolor">
-  <p:cSld>
-    <p:spTree>
-      <p:nvGrpSpPr>
-        <p:cNvPr id="133" name="Shape 133"/>
-        <p:cNvGrpSpPr/>
-        <p:nvPr/>
-      </p:nvGrpSpPr>
-      <p:grpSpPr>
-        <a:xfrm>
-          <a:off x="0" y="0"/>
-          <a:ext cx="0" cy="0"/>
-          <a:chOff x="0" y="0"/>
-          <a:chExt cx="0" cy="0"/>
-        </a:xfrm>
-      </p:grpSpPr>
-      <p:sp>
-        <p:nvSpPr>
-          <p:cNvPr id="134" name="Google Shape;134;p24"/>
-          <p:cNvSpPr txBox="1"/>
-          <p:nvPr>
-            <p:ph type="title"/>
-          </p:nvPr>
-        </p:nvSpPr>
-        <p:spPr>
-          <a:xfrm>
-            <a:off x="311725" y="500925"/>
-            <a:ext cx="8520600" cy="623700"/>
-          </a:xfrm>
-          <a:prstGeom prst="rect">
-            <a:avLst/>
-          </a:prstGeom>
-        </p:spPr>
-        <p:txBody>
-          <a:bodyPr anchorCtr="0" anchor="t" bIns="91425" lIns="91425" spcFirstLastPara="1" rIns="91425" wrap="square" tIns="91425">
-            <a:normAutofit/>
-          </a:bodyPr>
-          <a:lstStyle/>
-          <a:p>
-            <a:pPr indent="0" lvl="0" marL="0" rtl="0" algn="l">
-              <a:spcBef>
-                <a:spcPts val="0"/>
-              </a:spcBef>
-              <a:spcAft>
-                <a:spcPts val="0"/>
-              </a:spcAft>
-              <a:buNone/>
-            </a:pPr>
-            <a:r>
-              <a:rPr lang="en"/>
-              <a:t>Kubernetes</a:t>
-            </a:r>
-            <a:endParaRPr/>
-          </a:p>
-        </p:txBody>
-      </p:sp>
-      <p:pic>
-        <p:nvPicPr>
-          <p:cNvPr id="135" name="Google Shape;135;p24"/>
-          <p:cNvPicPr preferRelativeResize="0"/>
-          <p:nvPr/>
-        </p:nvPicPr>
-        <p:blipFill>
-          <a:blip r:embed="rId3">
-            <a:alphaModFix/>
-          </a:blip>
-          <a:stretch>
-            <a:fillRect/>
-          </a:stretch>
-        </p:blipFill>
-        <p:spPr>
-          <a:xfrm>
-            <a:off x="685800" y="1277025"/>
-            <a:ext cx="7948757" cy="3714076"/>
-          </a:xfrm>
-          <a:prstGeom prst="rect">
-            <a:avLst/>
-          </a:prstGeom>
-          <a:noFill/>
-          <a:ln>
-            <a:noFill/>
-          </a:ln>
-        </p:spPr>
-      </p:pic>
-      <p:sp>
-        <p:nvSpPr>
-          <p:cNvPr id="136" name="Google Shape;136;p24"/>
-          <p:cNvSpPr txBox="1"/>
-          <p:nvPr/>
-        </p:nvSpPr>
-        <p:spPr>
-          <a:xfrm>
-            <a:off x="132625" y="4848075"/>
-            <a:ext cx="8992500" cy="354000"/>
-          </a:xfrm>
-          <a:prstGeom prst="rect">
-            <a:avLst/>
-          </a:prstGeom>
-          <a:noFill/>
-          <a:ln>
-            <a:noFill/>
-          </a:ln>
-        </p:spPr>
-        <p:txBody>
-          <a:bodyPr anchorCtr="0" anchor="t" bIns="91425" lIns="91425" spcFirstLastPara="1" rIns="91425" wrap="square" tIns="91425">
-            <a:spAutoFit/>
-          </a:bodyPr>
-          <a:lstStyle/>
-          <a:p>
-            <a:pPr indent="0" lvl="0" marL="0" rtl="0" algn="l">
-              <a:spcBef>
-                <a:spcPts val="0"/>
-              </a:spcBef>
-              <a:spcAft>
-                <a:spcPts val="0"/>
-              </a:spcAft>
-              <a:buNone/>
-            </a:pPr>
-            <a:r>
-              <a:rPr lang="en" sz="1100">
-                <a:highlight>
-                  <a:srgbClr val="FFFFFF"/>
-                </a:highlight>
-              </a:rPr>
-              <a:t>Kubernetes, also known as K8s, is an open-source system for automating deployment, scaling, and management of containerized applications</a:t>
-            </a:r>
-            <a:endParaRPr sz="1100"/>
-          </a:p>
-        </p:txBody>
-      </p:sp>
-    </p:spTree>
-  </p:cSld>
-  <p:clrMapOvr>
-    <a:masterClrMapping/>
-  </p:clrMapOvr>
-</p:sld>
-</file>
-
-<file path=ppt/slides/slide13.xml><?xml version="1.0" encoding="utf-8"?>
-<p:sld xmlns:a="http://schemas.openxmlformats.org/drawingml/2006/main" xmlns:r="http://schemas.openxmlformats.org/officeDocument/2006/relationships" xmlns:mc="http://schemas.openxmlformats.org/markup-compatibility/2006" xmlns:mv="urn:schemas-microsoft-com:mac:vml" xmlns:p="http://schemas.openxmlformats.org/presentationml/2006/main" xmlns:c="http://schemas.openxmlformats.org/drawingml/2006/chart" xmlns:dgm="http://schemas.openxmlformats.org/drawingml/2006/diagram" xmlns:o="urn:schemas-microsoft-com:office:office" xmlns:v="urn:schemas-microsoft-com:vml" xmlns:pvml="urn:schemas-microsoft-com:office:powerpoint" xmlns:com="http://schemas.openxmlformats.org/drawingml/2006/compatibility" xmlns:p14="http://schemas.microsoft.com/office/powerpoint/2010/main" xmlns:p15="http://schemas.microsoft.com/office/powerpoint/2012/main" xmlns:ahyp="http://schemas.microsoft.com/office/drawing/2018/hyperlinkcolor">
-  <p:cSld>
-    <p:spTree>
-      <p:nvGrpSpPr>
-        <p:cNvPr id="140" name="Shape 140"/>
-        <p:cNvGrpSpPr/>
-        <p:nvPr/>
-      </p:nvGrpSpPr>
-      <p:grpSpPr>
-        <a:xfrm>
-          <a:off x="0" y="0"/>
-          <a:ext cx="0" cy="0"/>
-          <a:chOff x="0" y="0"/>
-          <a:chExt cx="0" cy="0"/>
-        </a:xfrm>
-      </p:grpSpPr>
-      <p:sp>
-        <p:nvSpPr>
-          <p:cNvPr id="141" name="Google Shape;141;p25"/>
-          <p:cNvSpPr txBox="1"/>
-          <p:nvPr>
-            <p:ph type="title"/>
-          </p:nvPr>
-        </p:nvSpPr>
-        <p:spPr>
-          <a:xfrm>
-            <a:off x="311725" y="500925"/>
-            <a:ext cx="8520600" cy="623700"/>
-          </a:xfrm>
-          <a:prstGeom prst="rect">
-            <a:avLst/>
-          </a:prstGeom>
-        </p:spPr>
-        <p:txBody>
-          <a:bodyPr anchorCtr="0" anchor="t" bIns="91425" lIns="91425" spcFirstLastPara="1" rIns="91425" wrap="square" tIns="91425">
-            <a:normAutofit/>
-          </a:bodyPr>
-          <a:lstStyle/>
-          <a:p>
-            <a:pPr indent="0" lvl="0" marL="0" rtl="0" algn="l">
-              <a:spcBef>
-                <a:spcPts val="0"/>
-              </a:spcBef>
-              <a:spcAft>
-                <a:spcPts val="0"/>
-              </a:spcAft>
-              <a:buNone/>
-            </a:pPr>
-            <a:r>
-              <a:rPr lang="en"/>
-              <a:t>Hands On</a:t>
-            </a:r>
-            <a:endParaRPr/>
-          </a:p>
-        </p:txBody>
-      </p:sp>
-      <p:sp>
-        <p:nvSpPr>
-          <p:cNvPr id="142" name="Google Shape;142;p25"/>
-          <p:cNvSpPr txBox="1"/>
-          <p:nvPr/>
-        </p:nvSpPr>
-        <p:spPr>
-          <a:xfrm>
-            <a:off x="435350" y="1356725"/>
-            <a:ext cx="8397000" cy="3186300"/>
-          </a:xfrm>
-          <a:prstGeom prst="rect">
-            <a:avLst/>
-          </a:prstGeom>
-          <a:noFill/>
-          <a:ln>
-            <a:noFill/>
-          </a:ln>
-        </p:spPr>
-        <p:txBody>
-          <a:bodyPr anchorCtr="0" anchor="t" bIns="91425" lIns="91425" spcFirstLastPara="1" rIns="91425" wrap="square" tIns="91425">
-            <a:spAutoFit/>
-          </a:bodyPr>
-          <a:lstStyle/>
-          <a:p>
-            <a:pPr indent="-323850" lvl="0" marL="457200" rtl="0" algn="l">
-              <a:spcBef>
-                <a:spcPts val="0"/>
-              </a:spcBef>
-              <a:spcAft>
-                <a:spcPts val="0"/>
-              </a:spcAft>
-              <a:buClr>
-                <a:srgbClr val="4C4C51"/>
-              </a:buClr>
-              <a:buSzPts val="1500"/>
-              <a:buChar char="➔"/>
-            </a:pPr>
-            <a:r>
-              <a:rPr lang="en" sz="1500">
-                <a:solidFill>
-                  <a:srgbClr val="4C4C51"/>
-                </a:solidFill>
-              </a:rPr>
-              <a:t>Installing Kubernetes</a:t>
-            </a:r>
-            <a:endParaRPr sz="1500">
-              <a:solidFill>
-                <a:srgbClr val="4C4C51"/>
-              </a:solidFill>
-            </a:endParaRPr>
-          </a:p>
-          <a:p>
-            <a:pPr indent="-323850" lvl="0" marL="457200" rtl="0" algn="l">
-              <a:spcBef>
-                <a:spcPts val="0"/>
-              </a:spcBef>
-              <a:spcAft>
-                <a:spcPts val="0"/>
-              </a:spcAft>
-              <a:buClr>
-                <a:srgbClr val="4C4C51"/>
-              </a:buClr>
-              <a:buSzPts val="1500"/>
-              <a:buChar char="➔"/>
-            </a:pPr>
-            <a:r>
-              <a:rPr lang="en" sz="1500">
-                <a:solidFill>
-                  <a:srgbClr val="4C4C51"/>
-                </a:solidFill>
-              </a:rPr>
-              <a:t>Running Kubernetes Pods</a:t>
-            </a:r>
-            <a:endParaRPr sz="1500">
-              <a:solidFill>
-                <a:srgbClr val="4C4C51"/>
-              </a:solidFill>
-            </a:endParaRPr>
-          </a:p>
-          <a:p>
-            <a:pPr indent="-323850" lvl="0" marL="457200" rtl="0" algn="l">
-              <a:spcBef>
-                <a:spcPts val="0"/>
-              </a:spcBef>
-              <a:spcAft>
-                <a:spcPts val="0"/>
-              </a:spcAft>
-              <a:buClr>
-                <a:srgbClr val="4C4C51"/>
-              </a:buClr>
-              <a:buSzPts val="1500"/>
-              <a:buChar char="➔"/>
-            </a:pPr>
-            <a:r>
-              <a:rPr lang="en" sz="1500">
-                <a:solidFill>
-                  <a:srgbClr val="4C4C51"/>
-                </a:solidFill>
-              </a:rPr>
-              <a:t>Viewing P</a:t>
-            </a:r>
-            <a:r>
-              <a:rPr lang="en" sz="1500">
-                <a:solidFill>
-                  <a:srgbClr val="4C4C51"/>
-                </a:solidFill>
-              </a:rPr>
-              <a:t>od</a:t>
-            </a:r>
-            <a:r>
-              <a:rPr lang="en" sz="1500">
-                <a:solidFill>
-                  <a:srgbClr val="4C4C51"/>
-                </a:solidFill>
-              </a:rPr>
-              <a:t> Information</a:t>
-            </a:r>
-            <a:endParaRPr sz="1500">
-              <a:solidFill>
-                <a:srgbClr val="4C4C51"/>
-              </a:solidFill>
-            </a:endParaRPr>
-          </a:p>
-          <a:p>
-            <a:pPr indent="-323850" lvl="0" marL="457200" rtl="0" algn="l">
-              <a:spcBef>
-                <a:spcPts val="0"/>
-              </a:spcBef>
-              <a:spcAft>
-                <a:spcPts val="0"/>
-              </a:spcAft>
-              <a:buClr>
-                <a:srgbClr val="4C4C51"/>
-              </a:buClr>
-              <a:buSzPts val="1500"/>
-              <a:buChar char="➔"/>
-            </a:pPr>
-            <a:r>
-              <a:rPr lang="en" sz="1500">
-                <a:solidFill>
-                  <a:srgbClr val="4C4C51"/>
-                </a:solidFill>
-              </a:rPr>
-              <a:t>Exposing Pod and Accessing the Applications</a:t>
-            </a:r>
-            <a:endParaRPr sz="1500">
-              <a:solidFill>
-                <a:srgbClr val="4C4C51"/>
-              </a:solidFill>
-            </a:endParaRPr>
-          </a:p>
-          <a:p>
-            <a:pPr indent="-323850" lvl="0" marL="457200" rtl="0" algn="l">
-              <a:spcBef>
-                <a:spcPts val="0"/>
-              </a:spcBef>
-              <a:spcAft>
-                <a:spcPts val="0"/>
-              </a:spcAft>
-              <a:buClr>
-                <a:srgbClr val="4C4C51"/>
-              </a:buClr>
-              <a:buSzPts val="1500"/>
-              <a:buChar char="➔"/>
-            </a:pPr>
-            <a:r>
-              <a:rPr lang="en" sz="1500">
-                <a:solidFill>
-                  <a:srgbClr val="4C4C51"/>
-                </a:solidFill>
-              </a:rPr>
-              <a:t>Inspecting Pod Logs</a:t>
-            </a:r>
-            <a:endParaRPr sz="1500">
-              <a:solidFill>
-                <a:srgbClr val="4C4C51"/>
-              </a:solidFill>
-            </a:endParaRPr>
-          </a:p>
-          <a:p>
-            <a:pPr indent="-323850" lvl="0" marL="457200" rtl="0" algn="l">
-              <a:spcBef>
-                <a:spcPts val="0"/>
-              </a:spcBef>
-              <a:spcAft>
-                <a:spcPts val="0"/>
-              </a:spcAft>
-              <a:buClr>
-                <a:srgbClr val="4C4C51"/>
-              </a:buClr>
-              <a:buSzPts val="1500"/>
-              <a:buChar char="➔"/>
-            </a:pPr>
-            <a:r>
-              <a:rPr lang="en" sz="1500">
-                <a:solidFill>
-                  <a:srgbClr val="4C4C51"/>
-                </a:solidFill>
-              </a:rPr>
-              <a:t>Login to the Pods</a:t>
-            </a:r>
-            <a:endParaRPr sz="1500">
-              <a:solidFill>
-                <a:srgbClr val="4C4C51"/>
-              </a:solidFill>
-            </a:endParaRPr>
-          </a:p>
-          <a:p>
-            <a:pPr indent="-323850" lvl="0" marL="457200" rtl="0" algn="l">
-              <a:spcBef>
-                <a:spcPts val="0"/>
-              </a:spcBef>
-              <a:spcAft>
-                <a:spcPts val="0"/>
-              </a:spcAft>
-              <a:buClr>
-                <a:srgbClr val="4C4C51"/>
-              </a:buClr>
-              <a:buSzPts val="1500"/>
-              <a:buChar char="➔"/>
-            </a:pPr>
-            <a:r>
-              <a:rPr lang="en" sz="1500">
-                <a:solidFill>
-                  <a:srgbClr val="4C4C51"/>
-                </a:solidFill>
-              </a:rPr>
-              <a:t>Stop / Restart / Kill Pods</a:t>
-            </a:r>
-            <a:endParaRPr sz="1500">
-              <a:solidFill>
-                <a:srgbClr val="4C4C51"/>
-              </a:solidFill>
-            </a:endParaRPr>
-          </a:p>
-          <a:p>
-            <a:pPr indent="-323850" lvl="0" marL="457200" rtl="0" algn="l">
-              <a:spcBef>
-                <a:spcPts val="0"/>
-              </a:spcBef>
-              <a:spcAft>
-                <a:spcPts val="0"/>
-              </a:spcAft>
-              <a:buClr>
-                <a:srgbClr val="4C4C51"/>
-              </a:buClr>
-              <a:buSzPts val="1500"/>
-              <a:buChar char="➔"/>
-            </a:pPr>
-            <a:r>
-              <a:rPr lang="en" sz="1500">
-                <a:solidFill>
-                  <a:srgbClr val="4C4C51"/>
-                </a:solidFill>
-              </a:rPr>
-              <a:t>Running Pods with Replicas</a:t>
-            </a:r>
-            <a:endParaRPr sz="1500">
-              <a:solidFill>
-                <a:srgbClr val="4C4C51"/>
-              </a:solidFill>
-            </a:endParaRPr>
-          </a:p>
-          <a:p>
-            <a:pPr indent="-323850" lvl="0" marL="457200" rtl="0" algn="l">
-              <a:spcBef>
-                <a:spcPts val="0"/>
-              </a:spcBef>
-              <a:spcAft>
-                <a:spcPts val="0"/>
-              </a:spcAft>
-              <a:buClr>
-                <a:srgbClr val="4C4C51"/>
-              </a:buClr>
-              <a:buSzPts val="1500"/>
-              <a:buChar char="➔"/>
-            </a:pPr>
-            <a:r>
-              <a:rPr lang="en" sz="1500">
-                <a:solidFill>
-                  <a:srgbClr val="4C4C51"/>
-                </a:solidFill>
-              </a:rPr>
-              <a:t>Inter Pod Communication</a:t>
-            </a:r>
-            <a:endParaRPr sz="1500">
-              <a:solidFill>
-                <a:srgbClr val="4C4C51"/>
-              </a:solidFill>
-            </a:endParaRPr>
-          </a:p>
-          <a:p>
-            <a:pPr indent="-323850" lvl="0" marL="457200" rtl="0" algn="l">
-              <a:spcBef>
-                <a:spcPts val="0"/>
-              </a:spcBef>
-              <a:spcAft>
-                <a:spcPts val="0"/>
-              </a:spcAft>
-              <a:buClr>
-                <a:srgbClr val="4C4C51"/>
-              </a:buClr>
-              <a:buSzPts val="1500"/>
-              <a:buChar char="➔"/>
-            </a:pPr>
-            <a:r>
-              <a:rPr lang="en" sz="1500">
-                <a:solidFill>
-                  <a:srgbClr val="4C4C51"/>
-                </a:solidFill>
-              </a:rPr>
-              <a:t>Restricting Resources and Metrics</a:t>
-            </a:r>
-            <a:endParaRPr sz="1500">
-              <a:solidFill>
-                <a:srgbClr val="4C4C51"/>
-              </a:solidFill>
-            </a:endParaRPr>
-          </a:p>
-          <a:p>
-            <a:pPr indent="-323850" lvl="0" marL="457200" rtl="0" algn="l">
-              <a:spcBef>
-                <a:spcPts val="0"/>
-              </a:spcBef>
-              <a:spcAft>
-                <a:spcPts val="0"/>
-              </a:spcAft>
-              <a:buClr>
-                <a:srgbClr val="4C4C51"/>
-              </a:buClr>
-              <a:buSzPts val="1500"/>
-              <a:buChar char="➔"/>
-            </a:pPr>
-            <a:r>
-              <a:rPr lang="en" sz="1500">
-                <a:solidFill>
-                  <a:srgbClr val="4C4C51"/>
-                </a:solidFill>
-              </a:rPr>
-              <a:t>Namespaces</a:t>
-            </a:r>
-            <a:endParaRPr sz="1500">
-              <a:solidFill>
-                <a:srgbClr val="4C4C51"/>
-              </a:solidFill>
-            </a:endParaRPr>
-          </a:p>
-          <a:p>
-            <a:pPr indent="-323850" lvl="0" marL="457200" rtl="0" algn="l">
-              <a:spcBef>
-                <a:spcPts val="0"/>
-              </a:spcBef>
-              <a:spcAft>
-                <a:spcPts val="0"/>
-              </a:spcAft>
-              <a:buClr>
-                <a:srgbClr val="4C4C51"/>
-              </a:buClr>
-              <a:buSzPts val="1500"/>
-              <a:buChar char="➔"/>
-            </a:pPr>
-            <a:r>
-              <a:rPr lang="en" sz="1500">
-                <a:solidFill>
-                  <a:srgbClr val="4C4C51"/>
-                </a:solidFill>
-              </a:rPr>
-              <a:t>Environment Variables and Configmaps</a:t>
-            </a:r>
-            <a:endParaRPr sz="1500">
-              <a:solidFill>
-                <a:srgbClr val="4C4C51"/>
-              </a:solidFill>
-            </a:endParaRPr>
-          </a:p>
-          <a:p>
-            <a:pPr indent="-323850" lvl="0" marL="457200" rtl="0" algn="l">
-              <a:spcBef>
-                <a:spcPts val="0"/>
-              </a:spcBef>
-              <a:spcAft>
-                <a:spcPts val="0"/>
-              </a:spcAft>
-              <a:buClr>
-                <a:srgbClr val="4C4C51"/>
-              </a:buClr>
-              <a:buSzPts val="1500"/>
-              <a:buChar char="➔"/>
-            </a:pPr>
-            <a:r>
-              <a:rPr lang="en" sz="1500">
-                <a:solidFill>
-                  <a:srgbClr val="4C4C51"/>
-                </a:solidFill>
-              </a:rPr>
-              <a:t>Manifest File</a:t>
-            </a:r>
-            <a:endParaRPr sz="1500">
-              <a:solidFill>
-                <a:srgbClr val="4C4C51"/>
-              </a:solidFill>
-            </a:endParaRPr>
-          </a:p>
-        </p:txBody>
-      </p:sp>
-    </p:spTree>
-  </p:cSld>
-  <p:clrMapOvr>
-    <a:masterClrMapping/>
-  </p:clrMapOvr>
-</p:sld>
-</file>
-
-<file path=ppt/slides/slide14.xml><?xml version="1.0" encoding="utf-8"?>
-<p:sld xmlns:a="http://schemas.openxmlformats.org/drawingml/2006/main" xmlns:r="http://schemas.openxmlformats.org/officeDocument/2006/relationships" xmlns:mc="http://schemas.openxmlformats.org/markup-compatibility/2006" xmlns:mv="urn:schemas-microsoft-com:mac:vml" xmlns:p="http://schemas.openxmlformats.org/presentationml/2006/main" xmlns:c="http://schemas.openxmlformats.org/drawingml/2006/chart" xmlns:dgm="http://schemas.openxmlformats.org/drawingml/2006/diagram" xmlns:o="urn:schemas-microsoft-com:office:office" xmlns:v="urn:schemas-microsoft-com:vml" xmlns:pvml="urn:schemas-microsoft-com:office:powerpoint" xmlns:com="http://schemas.openxmlformats.org/drawingml/2006/compatibility" xmlns:p14="http://schemas.microsoft.com/office/powerpoint/2010/main" xmlns:p15="http://schemas.microsoft.com/office/powerpoint/2012/main" xmlns:ahyp="http://schemas.microsoft.com/office/drawing/2018/hyperlinkcolor">
-  <p:cSld>
-    <p:spTree>
-      <p:nvGrpSpPr>
-        <p:cNvPr id="146" name="Shape 146"/>
-        <p:cNvGrpSpPr/>
-        <p:nvPr/>
-      </p:nvGrpSpPr>
-      <p:grpSpPr>
-        <a:xfrm>
-          <a:off x="0" y="0"/>
-          <a:ext cx="0" cy="0"/>
-          <a:chOff x="0" y="0"/>
-          <a:chExt cx="0" cy="0"/>
-        </a:xfrm>
-      </p:grpSpPr>
-      <p:sp>
-        <p:nvSpPr>
-          <p:cNvPr id="147" name="Google Shape;147;p26"/>
-          <p:cNvSpPr txBox="1"/>
-          <p:nvPr>
-            <p:ph type="title"/>
-          </p:nvPr>
-        </p:nvSpPr>
-        <p:spPr>
-          <a:xfrm>
-            <a:off x="311725" y="500925"/>
-            <a:ext cx="8520600" cy="623700"/>
-          </a:xfrm>
-          <a:prstGeom prst="rect">
-            <a:avLst/>
-          </a:prstGeom>
-        </p:spPr>
-        <p:txBody>
-          <a:bodyPr anchorCtr="0" anchor="t" bIns="91425" lIns="91425" spcFirstLastPara="1" rIns="91425" wrap="square" tIns="91425">
-            <a:normAutofit/>
-          </a:bodyPr>
-          <a:lstStyle/>
-          <a:p>
-            <a:pPr indent="0" lvl="0" marL="0" rtl="0" algn="l">
-              <a:spcBef>
-                <a:spcPts val="0"/>
-              </a:spcBef>
-              <a:spcAft>
-                <a:spcPts val="0"/>
-              </a:spcAft>
-              <a:buNone/>
-            </a:pPr>
-            <a:r>
-              <a:rPr lang="en"/>
-              <a:t>Docker Swarm vs Kubernetes</a:t>
-            </a:r>
-            <a:endParaRPr/>
-          </a:p>
-        </p:txBody>
-      </p:sp>
-      <p:sp>
-        <p:nvSpPr>
-          <p:cNvPr id="148" name="Google Shape;148;p26"/>
-          <p:cNvSpPr txBox="1"/>
-          <p:nvPr/>
-        </p:nvSpPr>
-        <p:spPr>
-          <a:xfrm>
-            <a:off x="435350" y="1356725"/>
-            <a:ext cx="8397000" cy="1800900"/>
-          </a:xfrm>
-          <a:prstGeom prst="rect">
-            <a:avLst/>
-          </a:prstGeom>
-          <a:noFill/>
-          <a:ln>
-            <a:noFill/>
-          </a:ln>
-        </p:spPr>
-        <p:txBody>
-          <a:bodyPr anchorCtr="0" anchor="t" bIns="91425" lIns="91425" spcFirstLastPara="1" rIns="91425" wrap="square" tIns="91425">
-            <a:spAutoFit/>
-          </a:bodyPr>
-          <a:lstStyle/>
-          <a:p>
-            <a:pPr indent="-323850" lvl="0" marL="457200" rtl="0" algn="l">
-              <a:spcBef>
-                <a:spcPts val="0"/>
-              </a:spcBef>
-              <a:spcAft>
-                <a:spcPts val="0"/>
-              </a:spcAft>
-              <a:buClr>
-                <a:srgbClr val="4C4C51"/>
-              </a:buClr>
-              <a:buSzPts val="1500"/>
-              <a:buChar char="●"/>
-            </a:pPr>
-            <a:r>
-              <a:rPr lang="en" sz="1500">
-                <a:solidFill>
-                  <a:srgbClr val="4C4C51"/>
-                </a:solidFill>
-              </a:rPr>
-              <a:t>Swarm</a:t>
-            </a:r>
-            <a:endParaRPr sz="1500">
-              <a:solidFill>
-                <a:srgbClr val="4C4C51"/>
-              </a:solidFill>
-            </a:endParaRPr>
-          </a:p>
-          <a:p>
-            <a:pPr indent="-323850" lvl="1" marL="914400" rtl="0" algn="l">
-              <a:spcBef>
-                <a:spcPts val="0"/>
-              </a:spcBef>
-              <a:spcAft>
-                <a:spcPts val="0"/>
-              </a:spcAft>
-              <a:buClr>
-                <a:srgbClr val="4C4C51"/>
-              </a:buClr>
-              <a:buSzPts val="1500"/>
-              <a:buChar char="○"/>
-            </a:pPr>
-            <a:r>
-              <a:rPr lang="en" sz="1500">
-                <a:solidFill>
-                  <a:srgbClr val="4C4C51"/>
-                </a:solidFill>
-              </a:rPr>
-              <a:t>Lightweight and easy to understand</a:t>
-            </a:r>
-            <a:endParaRPr sz="1500">
-              <a:solidFill>
-                <a:srgbClr val="4C4C51"/>
-              </a:solidFill>
-            </a:endParaRPr>
-          </a:p>
-          <a:p>
-            <a:pPr indent="-323850" lvl="1" marL="914400" rtl="0" algn="l">
-              <a:spcBef>
-                <a:spcPts val="0"/>
-              </a:spcBef>
-              <a:spcAft>
-                <a:spcPts val="0"/>
-              </a:spcAft>
-              <a:buClr>
-                <a:srgbClr val="4C4C51"/>
-              </a:buClr>
-              <a:buSzPts val="1500"/>
-              <a:buChar char="○"/>
-            </a:pPr>
-            <a:r>
-              <a:rPr lang="en" sz="1500">
-                <a:solidFill>
-                  <a:srgbClr val="4C4C51"/>
-                </a:solidFill>
-              </a:rPr>
-              <a:t>No Autoscaling</a:t>
-            </a:r>
-            <a:endParaRPr sz="1500">
-              <a:solidFill>
-                <a:srgbClr val="4C4C51"/>
-              </a:solidFill>
-            </a:endParaRPr>
-          </a:p>
-          <a:p>
-            <a:pPr indent="-323850" lvl="1" marL="914400" rtl="0" algn="l">
-              <a:spcBef>
-                <a:spcPts val="0"/>
-              </a:spcBef>
-              <a:spcAft>
-                <a:spcPts val="0"/>
-              </a:spcAft>
-              <a:buClr>
-                <a:srgbClr val="4C4C51"/>
-              </a:buClr>
-              <a:buSzPts val="1500"/>
-              <a:buChar char="○"/>
-            </a:pPr>
-            <a:r>
-              <a:rPr lang="en" sz="1500">
-                <a:solidFill>
-                  <a:srgbClr val="4C4C51"/>
-                </a:solidFill>
-              </a:rPr>
-              <a:t>No cloud provider integrations</a:t>
-            </a:r>
-            <a:endParaRPr sz="1500">
-              <a:solidFill>
-                <a:srgbClr val="4C4C51"/>
-              </a:solidFill>
-            </a:endParaRPr>
-          </a:p>
-          <a:p>
-            <a:pPr indent="-323850" lvl="1" marL="914400" rtl="0" algn="l">
-              <a:spcBef>
-                <a:spcPts val="0"/>
-              </a:spcBef>
-              <a:spcAft>
-                <a:spcPts val="0"/>
-              </a:spcAft>
-              <a:buClr>
-                <a:srgbClr val="4C4C51"/>
-              </a:buClr>
-              <a:buSzPts val="1500"/>
-              <a:buChar char="○"/>
-            </a:pPr>
-            <a:r>
-              <a:rPr lang="en" sz="1500">
-                <a:solidFill>
-                  <a:srgbClr val="4C4C51"/>
-                </a:solidFill>
-              </a:rPr>
-              <a:t>Limited Access Control</a:t>
-            </a:r>
-            <a:endParaRPr sz="1500">
-              <a:solidFill>
-                <a:srgbClr val="4C4C51"/>
-              </a:solidFill>
-            </a:endParaRPr>
-          </a:p>
-          <a:p>
-            <a:pPr indent="-323850" lvl="1" marL="914400" rtl="0" algn="l">
-              <a:spcBef>
-                <a:spcPts val="0"/>
-              </a:spcBef>
-              <a:spcAft>
-                <a:spcPts val="0"/>
-              </a:spcAft>
-              <a:buClr>
-                <a:srgbClr val="4C4C51"/>
-              </a:buClr>
-              <a:buSzPts val="1500"/>
-              <a:buChar char="○"/>
-            </a:pPr>
-            <a:r>
-              <a:rPr lang="en" sz="1500">
-                <a:solidFill>
-                  <a:srgbClr val="4C4C51"/>
-                </a:solidFill>
-              </a:rPr>
-              <a:t>Lower Cost</a:t>
-            </a:r>
-            <a:endParaRPr sz="1500">
-              <a:solidFill>
-                <a:srgbClr val="4C4C51"/>
-              </a:solidFill>
-            </a:endParaRPr>
-          </a:p>
-          <a:p>
-            <a:pPr indent="-323850" lvl="1" marL="914400" rtl="0" algn="l">
-              <a:spcBef>
-                <a:spcPts val="0"/>
-              </a:spcBef>
-              <a:spcAft>
-                <a:spcPts val="0"/>
-              </a:spcAft>
-              <a:buClr>
-                <a:srgbClr val="4C4C51"/>
-              </a:buClr>
-              <a:buSzPts val="1500"/>
-              <a:buChar char="○"/>
-            </a:pPr>
-            <a:r>
-              <a:rPr lang="en" sz="1500">
-                <a:solidFill>
-                  <a:srgbClr val="4C4C51"/>
-                </a:solidFill>
-              </a:rPr>
-              <a:t>Has load balancing out of the box</a:t>
-            </a:r>
-            <a:endParaRPr sz="1500">
-              <a:solidFill>
-                <a:srgbClr val="4C4C51"/>
-              </a:solidFill>
-            </a:endParaRPr>
-          </a:p>
-        </p:txBody>
-      </p:sp>
-      <p:sp>
-        <p:nvSpPr>
-          <p:cNvPr id="149" name="Google Shape;149;p26"/>
-          <p:cNvSpPr txBox="1"/>
-          <p:nvPr/>
-        </p:nvSpPr>
-        <p:spPr>
-          <a:xfrm>
-            <a:off x="435350" y="3185525"/>
-            <a:ext cx="8397000" cy="1800900"/>
-          </a:xfrm>
-          <a:prstGeom prst="rect">
-            <a:avLst/>
-          </a:prstGeom>
-          <a:noFill/>
-          <a:ln>
-            <a:noFill/>
-          </a:ln>
-        </p:spPr>
-        <p:txBody>
-          <a:bodyPr anchorCtr="0" anchor="t" bIns="91425" lIns="91425" spcFirstLastPara="1" rIns="91425" wrap="square" tIns="91425">
-            <a:spAutoFit/>
-          </a:bodyPr>
-          <a:lstStyle/>
-          <a:p>
-            <a:pPr indent="-323850" lvl="0" marL="457200" rtl="0" algn="l">
-              <a:spcBef>
-                <a:spcPts val="0"/>
-              </a:spcBef>
-              <a:spcAft>
-                <a:spcPts val="0"/>
-              </a:spcAft>
-              <a:buClr>
-                <a:srgbClr val="4C4C51"/>
-              </a:buClr>
-              <a:buSzPts val="1500"/>
-              <a:buChar char="●"/>
-            </a:pPr>
-            <a:r>
-              <a:rPr lang="en" sz="1500">
-                <a:solidFill>
-                  <a:srgbClr val="4C4C51"/>
-                </a:solidFill>
-              </a:rPr>
-              <a:t>Kubernetes</a:t>
-            </a:r>
-            <a:endParaRPr sz="1500">
-              <a:solidFill>
-                <a:srgbClr val="4C4C51"/>
-              </a:solidFill>
-            </a:endParaRPr>
-          </a:p>
-          <a:p>
-            <a:pPr indent="-323850" lvl="1" marL="914400" rtl="0" algn="l">
-              <a:spcBef>
-                <a:spcPts val="0"/>
-              </a:spcBef>
-              <a:spcAft>
-                <a:spcPts val="0"/>
-              </a:spcAft>
-              <a:buClr>
-                <a:srgbClr val="4C4C51"/>
-              </a:buClr>
-              <a:buSzPts val="1500"/>
-              <a:buChar char="○"/>
-            </a:pPr>
-            <a:r>
-              <a:rPr lang="en" sz="1500">
-                <a:solidFill>
-                  <a:srgbClr val="4C4C51"/>
-                </a:solidFill>
-              </a:rPr>
-              <a:t>Complex and difficult to understanding</a:t>
-            </a:r>
-            <a:endParaRPr sz="1500">
-              <a:solidFill>
-                <a:srgbClr val="4C4C51"/>
-              </a:solidFill>
-            </a:endParaRPr>
-          </a:p>
-          <a:p>
-            <a:pPr indent="-323850" lvl="1" marL="914400" rtl="0" algn="l">
-              <a:spcBef>
-                <a:spcPts val="0"/>
-              </a:spcBef>
-              <a:spcAft>
-                <a:spcPts val="0"/>
-              </a:spcAft>
-              <a:buClr>
-                <a:srgbClr val="4C4C51"/>
-              </a:buClr>
-              <a:buSzPts val="1500"/>
-              <a:buChar char="○"/>
-            </a:pPr>
-            <a:r>
-              <a:rPr lang="en" sz="1500">
-                <a:solidFill>
-                  <a:srgbClr val="4C4C51"/>
-                </a:solidFill>
-              </a:rPr>
-              <a:t>Autoscaling</a:t>
-            </a:r>
-            <a:endParaRPr sz="1500">
-              <a:solidFill>
-                <a:srgbClr val="4C4C51"/>
-              </a:solidFill>
-            </a:endParaRPr>
-          </a:p>
-          <a:p>
-            <a:pPr indent="-323850" lvl="1" marL="914400" rtl="0" algn="l">
-              <a:spcBef>
-                <a:spcPts val="0"/>
-              </a:spcBef>
-              <a:spcAft>
-                <a:spcPts val="0"/>
-              </a:spcAft>
-              <a:buClr>
-                <a:srgbClr val="4C4C51"/>
-              </a:buClr>
-              <a:buSzPts val="1500"/>
-              <a:buChar char="○"/>
-            </a:pPr>
-            <a:r>
-              <a:rPr lang="en" sz="1500">
-                <a:solidFill>
-                  <a:srgbClr val="4C4C51"/>
-                </a:solidFill>
-              </a:rPr>
-              <a:t>Cloud provider integrations</a:t>
-            </a:r>
-            <a:endParaRPr sz="1500">
-              <a:solidFill>
-                <a:srgbClr val="4C4C51"/>
-              </a:solidFill>
-            </a:endParaRPr>
-          </a:p>
-          <a:p>
-            <a:pPr indent="-323850" lvl="1" marL="914400" rtl="0" algn="l">
-              <a:spcBef>
-                <a:spcPts val="0"/>
-              </a:spcBef>
-              <a:spcAft>
-                <a:spcPts val="0"/>
-              </a:spcAft>
-              <a:buClr>
-                <a:srgbClr val="4C4C51"/>
-              </a:buClr>
-              <a:buSzPts val="1500"/>
-              <a:buChar char="○"/>
-            </a:pPr>
-            <a:r>
-              <a:rPr lang="en" sz="1500">
-                <a:solidFill>
-                  <a:srgbClr val="4C4C51"/>
-                </a:solidFill>
-              </a:rPr>
-              <a:t>Advanced Access Control</a:t>
-            </a:r>
-            <a:endParaRPr sz="1500">
-              <a:solidFill>
-                <a:srgbClr val="4C4C51"/>
-              </a:solidFill>
-            </a:endParaRPr>
-          </a:p>
-          <a:p>
-            <a:pPr indent="-323850" lvl="1" marL="914400" rtl="0" algn="l">
-              <a:spcBef>
-                <a:spcPts val="0"/>
-              </a:spcBef>
-              <a:spcAft>
-                <a:spcPts val="0"/>
-              </a:spcAft>
-              <a:buClr>
-                <a:srgbClr val="4C4C51"/>
-              </a:buClr>
-              <a:buSzPts val="1500"/>
-              <a:buChar char="○"/>
-            </a:pPr>
-            <a:r>
-              <a:rPr lang="en" sz="1500">
-                <a:solidFill>
-                  <a:srgbClr val="4C4C51"/>
-                </a:solidFill>
-              </a:rPr>
-              <a:t>Higher Cost</a:t>
-            </a:r>
-            <a:endParaRPr sz="1500">
-              <a:solidFill>
-                <a:srgbClr val="4C4C51"/>
-              </a:solidFill>
-            </a:endParaRPr>
-          </a:p>
-          <a:p>
-            <a:pPr indent="-323850" lvl="1" marL="914400" rtl="0" algn="l">
-              <a:spcBef>
-                <a:spcPts val="0"/>
-              </a:spcBef>
-              <a:spcAft>
-                <a:spcPts val="0"/>
-              </a:spcAft>
-              <a:buClr>
-                <a:srgbClr val="4C4C51"/>
-              </a:buClr>
-              <a:buSzPts val="1500"/>
-              <a:buChar char="○"/>
-            </a:pPr>
-            <a:r>
-              <a:rPr lang="en" sz="1500">
-                <a:solidFill>
-                  <a:srgbClr val="4C4C51"/>
-                </a:solidFill>
-              </a:rPr>
-              <a:t>Need additional setup for load balancing</a:t>
-            </a:r>
-            <a:endParaRPr sz="1500">
-              <a:solidFill>
-                <a:srgbClr val="4C4C51"/>
-              </a:solidFill>
-            </a:endParaRPr>
-          </a:p>
-        </p:txBody>
-      </p:sp>
-    </p:spTree>
-  </p:cSld>
-  <p:clrMapOvr>
-    <a:masterClrMapping/>
-  </p:clrMapOvr>
-</p:sld>
-</file>
-
-<file path=ppt/slides/slide15.xml><?xml version="1.0" encoding="utf-8"?>
-<p:sld xmlns:a="http://schemas.openxmlformats.org/drawingml/2006/main" xmlns:r="http://schemas.openxmlformats.org/officeDocument/2006/relationships" xmlns:mc="http://schemas.openxmlformats.org/markup-compatibility/2006" xmlns:mv="urn:schemas-microsoft-com:mac:vml" xmlns:p="http://schemas.openxmlformats.org/presentationml/2006/main" xmlns:c="http://schemas.openxmlformats.org/drawingml/2006/chart" xmlns:dgm="http://schemas.openxmlformats.org/drawingml/2006/diagram" xmlns:o="urn:schemas-microsoft-com:office:office" xmlns:v="urn:schemas-microsoft-com:vml" xmlns:pvml="urn:schemas-microsoft-com:office:powerpoint" xmlns:com="http://schemas.openxmlformats.org/drawingml/2006/compatibility" xmlns:p14="http://schemas.microsoft.com/office/powerpoint/2010/main" xmlns:p15="http://schemas.microsoft.com/office/powerpoint/2012/main" xmlns:ahyp="http://schemas.microsoft.com/office/drawing/2018/hyperlinkcolor">
-  <p:cSld>
-    <p:spTree>
-      <p:nvGrpSpPr>
-        <p:cNvPr id="153" name="Shape 153"/>
-        <p:cNvGrpSpPr/>
-        <p:nvPr/>
-      </p:nvGrpSpPr>
-      <p:grpSpPr>
-        <a:xfrm>
-          <a:off x="0" y="0"/>
-          <a:ext cx="0" cy="0"/>
-          <a:chOff x="0" y="0"/>
-          <a:chExt cx="0" cy="0"/>
-        </a:xfrm>
-      </p:grpSpPr>
-      <p:sp>
-        <p:nvSpPr>
-          <p:cNvPr id="154" name="Google Shape;154;p27"/>
-          <p:cNvSpPr txBox="1"/>
-          <p:nvPr>
-            <p:ph type="title"/>
-          </p:nvPr>
-        </p:nvSpPr>
-        <p:spPr>
-          <a:xfrm>
-            <a:off x="311725" y="500925"/>
-            <a:ext cx="8520600" cy="623700"/>
-          </a:xfrm>
-          <a:prstGeom prst="rect">
-            <a:avLst/>
-          </a:prstGeom>
-        </p:spPr>
-        <p:txBody>
-          <a:bodyPr anchorCtr="0" anchor="t" bIns="91425" lIns="91425" spcFirstLastPara="1" rIns="91425" wrap="square" tIns="91425">
-            <a:normAutofit/>
-          </a:bodyPr>
-          <a:lstStyle/>
-          <a:p>
-            <a:pPr indent="0" lvl="0" marL="0" rtl="0" algn="l">
-              <a:spcBef>
-                <a:spcPts val="0"/>
-              </a:spcBef>
-              <a:spcAft>
-                <a:spcPts val="0"/>
-              </a:spcAft>
-              <a:buNone/>
-            </a:pPr>
-            <a:r>
-              <a:rPr lang="en"/>
-              <a:t>Containerd and Podman</a:t>
-            </a:r>
-            <a:endParaRPr/>
-          </a:p>
-        </p:txBody>
-      </p:sp>
-      <p:sp>
-        <p:nvSpPr>
-          <p:cNvPr id="155" name="Google Shape;155;p27"/>
-          <p:cNvSpPr txBox="1"/>
-          <p:nvPr/>
-        </p:nvSpPr>
-        <p:spPr>
-          <a:xfrm>
-            <a:off x="435350" y="1356725"/>
-            <a:ext cx="8397000" cy="3848100"/>
-          </a:xfrm>
-          <a:prstGeom prst="rect">
-            <a:avLst/>
-          </a:prstGeom>
-          <a:noFill/>
-          <a:ln>
-            <a:noFill/>
-          </a:ln>
-        </p:spPr>
-        <p:txBody>
-          <a:bodyPr anchorCtr="0" anchor="t" bIns="91425" lIns="91425" spcFirstLastPara="1" rIns="91425" wrap="square" tIns="91425">
-            <a:spAutoFit/>
-          </a:bodyPr>
-          <a:lstStyle/>
-          <a:p>
-            <a:pPr indent="0" lvl="0" marL="0" rtl="0" algn="l">
-              <a:spcBef>
-                <a:spcPts val="0"/>
-              </a:spcBef>
-              <a:spcAft>
-                <a:spcPts val="0"/>
-              </a:spcAft>
-              <a:buNone/>
-            </a:pPr>
-            <a:r>
-              <a:rPr lang="en">
-                <a:solidFill>
-                  <a:srgbClr val="4C4C51"/>
-                </a:solidFill>
-              </a:rPr>
-              <a:t>Containerd</a:t>
-            </a:r>
-            <a:endParaRPr>
-              <a:solidFill>
-                <a:srgbClr val="4C4C51"/>
-              </a:solidFill>
-            </a:endParaRPr>
-          </a:p>
-          <a:p>
-            <a:pPr indent="-317500" lvl="0" marL="457200" rtl="0" algn="l">
-              <a:spcBef>
-                <a:spcPts val="0"/>
-              </a:spcBef>
-              <a:spcAft>
-                <a:spcPts val="0"/>
-              </a:spcAft>
-              <a:buClr>
-                <a:srgbClr val="4C4C51"/>
-              </a:buClr>
-              <a:buSzPts val="1400"/>
-              <a:buChar char="-"/>
-            </a:pPr>
-            <a:r>
-              <a:rPr lang="en">
-                <a:solidFill>
-                  <a:srgbClr val="4C4C51"/>
-                </a:solidFill>
-              </a:rPr>
-              <a:t>An alternative to docker engine</a:t>
-            </a:r>
-            <a:endParaRPr>
-              <a:solidFill>
-                <a:srgbClr val="4C4C51"/>
-              </a:solidFill>
-            </a:endParaRPr>
-          </a:p>
-          <a:p>
-            <a:pPr indent="-317500" lvl="0" marL="457200" rtl="0" algn="l">
-              <a:spcBef>
-                <a:spcPts val="0"/>
-              </a:spcBef>
-              <a:spcAft>
-                <a:spcPts val="0"/>
-              </a:spcAft>
-              <a:buClr>
-                <a:srgbClr val="4C4C51"/>
-              </a:buClr>
-              <a:buSzPts val="1400"/>
-              <a:buChar char="-"/>
-            </a:pPr>
-            <a:r>
-              <a:rPr lang="en">
-                <a:solidFill>
-                  <a:srgbClr val="4C4C51"/>
-                </a:solidFill>
-              </a:rPr>
-              <a:t>Uses crictl as the command line tool</a:t>
-            </a:r>
-            <a:endParaRPr>
-              <a:solidFill>
-                <a:srgbClr val="4C4C51"/>
-              </a:solidFill>
-            </a:endParaRPr>
-          </a:p>
-          <a:p>
-            <a:pPr indent="0" lvl="0" marL="0" rtl="0" algn="l">
+            <a:pPr indent="457200" lvl="0" marL="0" rtl="0" algn="ctr">
               <a:spcBef>
                 <a:spcPts val="0"/>
               </a:spcBef>
@@ -10223,129 +8037,14 @@
               <a:t/>
             </a:r>
             <a:endParaRPr>
-              <a:solidFill>
-                <a:srgbClr val="4C4C51"/>
-              </a:solidFill>
+              <a:latin typeface="Roboto"/>
+              <a:ea typeface="Roboto"/>
+              <a:cs typeface="Roboto"/>
+              <a:sym typeface="Roboto"/>
             </a:endParaRPr>
           </a:p>
           <a:p>
-            <a:pPr indent="0" lvl="0" marL="0" rtl="0" algn="l">
-              <a:spcBef>
-                <a:spcPts val="0"/>
-              </a:spcBef>
-              <a:spcAft>
-                <a:spcPts val="0"/>
-              </a:spcAft>
-              <a:buNone/>
-            </a:pPr>
-            <a:r>
-              <a:rPr lang="en">
-                <a:solidFill>
-                  <a:srgbClr val="4C4C51"/>
-                </a:solidFill>
-              </a:rPr>
-              <a:t>Containerd Hands On</a:t>
-            </a:r>
-            <a:endParaRPr>
-              <a:solidFill>
-                <a:srgbClr val="4C4C51"/>
-              </a:solidFill>
-            </a:endParaRPr>
-          </a:p>
-          <a:p>
-            <a:pPr indent="-317500" lvl="0" marL="457200" rtl="0" algn="l">
-              <a:spcBef>
-                <a:spcPts val="0"/>
-              </a:spcBef>
-              <a:spcAft>
-                <a:spcPts val="0"/>
-              </a:spcAft>
-              <a:buClr>
-                <a:srgbClr val="4C4C51"/>
-              </a:buClr>
-              <a:buSzPts val="1400"/>
-              <a:buChar char="-"/>
-            </a:pPr>
-            <a:r>
-              <a:rPr lang="en">
-                <a:solidFill>
-                  <a:srgbClr val="4C4C51"/>
-                </a:solidFill>
-              </a:rPr>
-              <a:t>Installing containerd and crictl</a:t>
-            </a:r>
-            <a:endParaRPr>
-              <a:solidFill>
-                <a:srgbClr val="4C4C51"/>
-              </a:solidFill>
-            </a:endParaRPr>
-          </a:p>
-          <a:p>
-            <a:pPr indent="-317500" lvl="0" marL="457200" rtl="0" algn="l">
-              <a:spcBef>
-                <a:spcPts val="0"/>
-              </a:spcBef>
-              <a:spcAft>
-                <a:spcPts val="0"/>
-              </a:spcAft>
-              <a:buClr>
-                <a:srgbClr val="4C4C51"/>
-              </a:buClr>
-              <a:buSzPts val="1400"/>
-              <a:buChar char="-"/>
-            </a:pPr>
-            <a:r>
-              <a:rPr lang="en">
-                <a:solidFill>
-                  <a:srgbClr val="4C4C51"/>
-                </a:solidFill>
-              </a:rPr>
-              <a:t>Running containers on </a:t>
-            </a:r>
-            <a:r>
-              <a:rPr lang="en">
-                <a:solidFill>
-                  <a:srgbClr val="4C4C51"/>
-                </a:solidFill>
-              </a:rPr>
-              <a:t>containerd</a:t>
-            </a:r>
-            <a:endParaRPr>
-              <a:solidFill>
-                <a:srgbClr val="4C4C51"/>
-              </a:solidFill>
-            </a:endParaRPr>
-          </a:p>
-          <a:p>
-            <a:pPr indent="-317500" lvl="0" marL="457200" rtl="0" algn="l">
-              <a:spcBef>
-                <a:spcPts val="0"/>
-              </a:spcBef>
-              <a:spcAft>
-                <a:spcPts val="0"/>
-              </a:spcAft>
-              <a:buClr>
-                <a:srgbClr val="4C4C51"/>
-              </a:buClr>
-              <a:buSzPts val="1400"/>
-              <a:buChar char="-"/>
-            </a:pPr>
-            <a:r>
-              <a:rPr lang="en">
-                <a:solidFill>
-                  <a:srgbClr val="4C4C51"/>
-                </a:solidFill>
-              </a:rPr>
-              <a:t>Accessing containers / pods using crictl</a:t>
-            </a:r>
-            <a:endParaRPr>
-              <a:solidFill>
-                <a:srgbClr val="4C4C51"/>
-              </a:solidFill>
-            </a:endParaRPr>
-          </a:p>
-          <a:p>
-            <a:pPr indent="0" lvl="0" marL="0" rtl="0" algn="l">
+            <a:pPr indent="0" lvl="0" marL="0" rtl="0" algn="ctr">
               <a:spcBef>
                 <a:spcPts val="0"/>
               </a:spcBef>
@@ -10358,216 +8057,10 @@
               <a:t/>
             </a:r>
             <a:endParaRPr>
-              <a:solidFill>
-                <a:srgbClr val="4C4C51"/>
-              </a:solidFill>
-            </a:endParaRPr>
-          </a:p>
-          <a:p>
-            <a:pPr indent="0" lvl="0" marL="0" rtl="0" algn="l">
-              <a:spcBef>
-                <a:spcPts val="0"/>
-              </a:spcBef>
-              <a:spcAft>
-                <a:spcPts val="0"/>
-              </a:spcAft>
-              <a:buNone/>
-            </a:pPr>
-            <a:r>
-              <a:rPr lang="en">
-                <a:solidFill>
-                  <a:srgbClr val="4C4C51"/>
-                </a:solidFill>
-              </a:rPr>
-              <a:t>Podman</a:t>
-            </a:r>
-            <a:endParaRPr>
-              <a:solidFill>
-                <a:srgbClr val="4C4C51"/>
-              </a:solidFill>
-            </a:endParaRPr>
-          </a:p>
-          <a:p>
-            <a:pPr indent="-317500" lvl="0" marL="457200" rtl="0" algn="l">
-              <a:spcBef>
-                <a:spcPts val="0"/>
-              </a:spcBef>
-              <a:spcAft>
-                <a:spcPts val="0"/>
-              </a:spcAft>
-              <a:buClr>
-                <a:srgbClr val="4C4C51"/>
-              </a:buClr>
-              <a:buSzPts val="1400"/>
-              <a:buChar char="-"/>
-            </a:pPr>
-            <a:r>
-              <a:rPr lang="en">
-                <a:solidFill>
-                  <a:srgbClr val="4C4C51"/>
-                </a:solidFill>
-              </a:rPr>
-              <a:t>Pod man is an alternative to docker cli</a:t>
-            </a:r>
-            <a:endParaRPr>
-              <a:solidFill>
-                <a:srgbClr val="4C4C51"/>
-              </a:solidFill>
-            </a:endParaRPr>
-          </a:p>
-          <a:p>
-            <a:pPr indent="-317500" lvl="0" marL="457200" rtl="0" algn="l">
-              <a:spcBef>
-                <a:spcPts val="0"/>
-              </a:spcBef>
-              <a:spcAft>
-                <a:spcPts val="0"/>
-              </a:spcAft>
-              <a:buClr>
-                <a:srgbClr val="4C4C51"/>
-              </a:buClr>
-              <a:buSzPts val="1400"/>
-              <a:buChar char="-"/>
-            </a:pPr>
-            <a:r>
-              <a:rPr lang="en">
-                <a:solidFill>
-                  <a:srgbClr val="4C4C51"/>
-                </a:solidFill>
-              </a:rPr>
-              <a:t>Exactly like the docker command</a:t>
-            </a:r>
-            <a:endParaRPr>
-              <a:solidFill>
-                <a:srgbClr val="4C4C51"/>
-              </a:solidFill>
-            </a:endParaRPr>
-          </a:p>
-          <a:p>
-            <a:pPr indent="0" lvl="0" marL="0" rtl="0" algn="l">
-              <a:spcBef>
-                <a:spcPts val="0"/>
-              </a:spcBef>
-              <a:spcAft>
-                <a:spcPts val="0"/>
-              </a:spcAft>
-              <a:buNone/>
-            </a:pPr>
-            <a:r>
-              <a:t/>
-            </a:r>
-            <a:endParaRPr>
-              <a:solidFill>
-                <a:srgbClr val="4C4C51"/>
-              </a:solidFill>
-            </a:endParaRPr>
-          </a:p>
-          <a:p>
-            <a:pPr indent="0" lvl="0" marL="0" rtl="0" algn="l">
-              <a:spcBef>
-                <a:spcPts val="0"/>
-              </a:spcBef>
-              <a:spcAft>
-                <a:spcPts val="0"/>
-              </a:spcAft>
-              <a:buNone/>
-            </a:pPr>
-            <a:r>
-              <a:rPr lang="en">
-                <a:solidFill>
-                  <a:srgbClr val="4C4C51"/>
-                </a:solidFill>
-              </a:rPr>
-              <a:t>Podman Hands On</a:t>
-            </a:r>
-            <a:endParaRPr>
-              <a:solidFill>
-                <a:srgbClr val="4C4C51"/>
-              </a:solidFill>
-            </a:endParaRPr>
-          </a:p>
-          <a:p>
-            <a:pPr indent="-317500" lvl="0" marL="457200" rtl="0" algn="l">
-              <a:spcBef>
-                <a:spcPts val="0"/>
-              </a:spcBef>
-              <a:spcAft>
-                <a:spcPts val="0"/>
-              </a:spcAft>
-              <a:buClr>
-                <a:srgbClr val="4C4C51"/>
-              </a:buClr>
-              <a:buSzPts val="1400"/>
-              <a:buChar char="-"/>
-            </a:pPr>
-            <a:r>
-              <a:rPr lang="en">
-                <a:solidFill>
-                  <a:srgbClr val="4C4C51"/>
-                </a:solidFill>
-              </a:rPr>
-              <a:t>Building container images using podman</a:t>
-            </a:r>
-            <a:endParaRPr>
-              <a:solidFill>
-                <a:srgbClr val="4C4C51"/>
-              </a:solidFill>
-            </a:endParaRPr>
-          </a:p>
-          <a:p>
-            <a:pPr indent="-317500" lvl="0" marL="457200" rtl="0" algn="l">
-              <a:spcBef>
-                <a:spcPts val="0"/>
-              </a:spcBef>
-              <a:spcAft>
-                <a:spcPts val="0"/>
-              </a:spcAft>
-              <a:buClr>
-                <a:srgbClr val="4C4C51"/>
-              </a:buClr>
-              <a:buSzPts val="1400"/>
-              <a:buChar char="-"/>
-            </a:pPr>
-            <a:r>
-              <a:rPr lang="en">
-                <a:solidFill>
-                  <a:srgbClr val="4C4C51"/>
-                </a:solidFill>
-              </a:rPr>
-              <a:t>Running containers using podman</a:t>
-            </a:r>
-            <a:endParaRPr>
-              <a:solidFill>
-                <a:srgbClr val="4C4C51"/>
-              </a:solidFill>
-            </a:endParaRPr>
-          </a:p>
-          <a:p>
-            <a:pPr indent="-317500" lvl="0" marL="457200" rtl="0" algn="l">
-              <a:spcBef>
-                <a:spcPts val="0"/>
-              </a:spcBef>
-              <a:spcAft>
-                <a:spcPts val="0"/>
-              </a:spcAft>
-              <a:buClr>
-                <a:srgbClr val="4C4C51"/>
-              </a:buClr>
-              <a:buSzPts val="1400"/>
-              <a:buChar char="-"/>
-            </a:pPr>
-            <a:r>
-              <a:rPr lang="en">
-                <a:solidFill>
-                  <a:srgbClr val="4C4C51"/>
-                </a:solidFill>
-              </a:rPr>
-              <a:t>Accessing containers using podman</a:t>
-            </a:r>
-            <a:endParaRPr>
-              <a:solidFill>
-                <a:srgbClr val="4C4C51"/>
-              </a:solidFill>
+              <a:latin typeface="Roboto"/>
+              <a:ea typeface="Roboto"/>
+              <a:cs typeface="Roboto"/>
+              <a:sym typeface="Roboto"/>
             </a:endParaRPr>
           </a:p>
         </p:txBody>
@@ -11543,29 +9036,7 @@
                   <a:srgbClr val="FFFFFF"/>
                 </a:highlight>
               </a:rPr>
-              <a:t>Containers are lightweight and contain everything needed to run the application, so you do not need to rely on what is currently installed on the host. You can easily share containers and be sure that everyone </a:t>
-            </a:r>
-            <a:r>
-              <a:rPr lang="en" sz="1200">
-                <a:solidFill>
-                  <a:srgbClr val="4C4C51"/>
-                </a:solidFill>
-                <a:highlight>
-                  <a:srgbClr val="FFFFFF"/>
-                </a:highlight>
-              </a:rPr>
-              <a:t>you share with </a:t>
-            </a:r>
-            <a:r>
-              <a:rPr lang="en" sz="1200">
-                <a:solidFill>
-                  <a:srgbClr val="4C4C51"/>
-                </a:solidFill>
-                <a:highlight>
-                  <a:srgbClr val="FFFFFF"/>
-                </a:highlight>
-              </a:rPr>
-              <a:t>gets the same container that works in the same way</a:t>
+              <a:t>Containers are lightweight and contain everything needed to run the application, so you do not need to rely on what is currently installed on the host. You can easily share containers and be sure that everyone you share with gets the same container that works in the same way</a:t>
             </a:r>
             <a:endParaRPr sz="1200">
               <a:solidFill>
@@ -11637,11 +9108,7 @@
             </a:pPr>
             <a:r>
               <a:rPr lang="en"/>
-              <a:t>Linux </a:t>
-            </a:r>
-            <a:r>
-              <a:rPr lang="en"/>
-              <a:t>Cgroups</a:t>
+              <a:t>Linux Cgroups</a:t>
             </a:r>
             <a:endParaRPr/>
           </a:p>
@@ -11920,22 +9387,30 @@
             </a:pPr>
             <a:r>
               <a:rPr lang="en"/>
-              <a:t>Hands On</a:t>
+              <a:t>Docker Swarm</a:t>
             </a:r>
             <a:endParaRPr/>
           </a:p>
         </p:txBody>
       </p:sp>
-      <p:sp>
-        <p:nvSpPr>
+      <p:pic>
+        <p:nvPicPr>
           <p:cNvPr id="117" name="Google Shape;117;p21"/>
-          <p:cNvSpPr txBox="1"/>
+          <p:cNvPicPr preferRelativeResize="0"/>
           <p:nvPr/>
-        </p:nvSpPr>
+        </p:nvPicPr>
+        <p:blipFill>
+          <a:blip r:embed="rId3">
+            <a:alphaModFix/>
+          </a:blip>
+          <a:stretch>
+            <a:fillRect/>
+          </a:stretch>
+        </p:blipFill>
         <p:spPr>
           <a:xfrm>
-            <a:off x="435350" y="1356725"/>
-            <a:ext cx="8397000" cy="3648000"/>
+            <a:off x="685800" y="1353225"/>
+            <a:ext cx="7920298" cy="3714075"/>
           </a:xfrm>
           <a:prstGeom prst="rect">
             <a:avLst/>
@@ -11945,433 +9420,7 @@
             <a:noFill/>
           </a:ln>
         </p:spPr>
-        <p:txBody>
-          <a:bodyPr anchorCtr="0" anchor="t" bIns="91425" lIns="91425" spcFirstLastPara="1" rIns="91425" wrap="square" tIns="91425">
-            <a:spAutoFit/>
-          </a:bodyPr>
-          <a:lstStyle/>
-          <a:p>
-            <a:pPr indent="-323850" lvl="0" marL="457200" rtl="0" algn="l">
-              <a:spcBef>
-                <a:spcPts val="0"/>
-              </a:spcBef>
-              <a:spcAft>
-                <a:spcPts val="0"/>
-              </a:spcAft>
-              <a:buClr>
-                <a:srgbClr val="4C4C51"/>
-              </a:buClr>
-              <a:buSzPts val="1500"/>
-              <a:buChar char="➔"/>
-            </a:pPr>
-            <a:r>
-              <a:rPr lang="en" sz="1500">
-                <a:solidFill>
-                  <a:srgbClr val="4C4C51"/>
-                </a:solidFill>
-              </a:rPr>
-              <a:t>Vagrant and VirtualBox</a:t>
-            </a:r>
-            <a:endParaRPr sz="1500">
-              <a:solidFill>
-                <a:srgbClr val="4C4C51"/>
-              </a:solidFill>
-            </a:endParaRPr>
-          </a:p>
-          <a:p>
-            <a:pPr indent="-323850" lvl="0" marL="457200" rtl="0" algn="l">
-              <a:spcBef>
-                <a:spcPts val="0"/>
-              </a:spcBef>
-              <a:spcAft>
-                <a:spcPts val="0"/>
-              </a:spcAft>
-              <a:buClr>
-                <a:srgbClr val="4C4C51"/>
-              </a:buClr>
-              <a:buSzPts val="1500"/>
-              <a:buChar char="➔"/>
-            </a:pPr>
-            <a:r>
-              <a:rPr lang="en" sz="1500">
-                <a:solidFill>
-                  <a:srgbClr val="4C4C51"/>
-                </a:solidFill>
-              </a:rPr>
-              <a:t>Linux Cgroups and Namespaces</a:t>
-            </a:r>
-            <a:endParaRPr sz="1500">
-              <a:solidFill>
-                <a:srgbClr val="4C4C51"/>
-              </a:solidFill>
-            </a:endParaRPr>
-          </a:p>
-          <a:p>
-            <a:pPr indent="-323850" lvl="0" marL="457200" rtl="0" algn="l">
-              <a:spcBef>
-                <a:spcPts val="0"/>
-              </a:spcBef>
-              <a:spcAft>
-                <a:spcPts val="0"/>
-              </a:spcAft>
-              <a:buClr>
-                <a:srgbClr val="4C4C51"/>
-              </a:buClr>
-              <a:buSzPts val="1500"/>
-              <a:buChar char="➔"/>
-            </a:pPr>
-            <a:r>
-              <a:rPr lang="en" sz="1500">
-                <a:solidFill>
-                  <a:srgbClr val="4C4C51"/>
-                </a:solidFill>
-              </a:rPr>
-              <a:t>Installing Docker</a:t>
-            </a:r>
-            <a:endParaRPr sz="1500">
-              <a:solidFill>
-                <a:srgbClr val="4C4C51"/>
-              </a:solidFill>
-            </a:endParaRPr>
-          </a:p>
-          <a:p>
-            <a:pPr indent="-323850" lvl="0" marL="457200" rtl="0" algn="l">
-              <a:spcBef>
-                <a:spcPts val="0"/>
-              </a:spcBef>
-              <a:spcAft>
-                <a:spcPts val="0"/>
-              </a:spcAft>
-              <a:buClr>
-                <a:srgbClr val="4C4C51"/>
-              </a:buClr>
-              <a:buSzPts val="1500"/>
-              <a:buChar char="➔"/>
-            </a:pPr>
-            <a:r>
-              <a:rPr lang="en" sz="1500">
-                <a:solidFill>
-                  <a:srgbClr val="4C4C51"/>
-                </a:solidFill>
-              </a:rPr>
-              <a:t>Building and Pushing Docker Images</a:t>
-            </a:r>
-            <a:endParaRPr sz="1500">
-              <a:solidFill>
-                <a:srgbClr val="4C4C51"/>
-              </a:solidFill>
-            </a:endParaRPr>
-          </a:p>
-          <a:p>
-            <a:pPr indent="-323850" lvl="0" marL="457200" rtl="0" algn="l">
-              <a:spcBef>
-                <a:spcPts val="0"/>
-              </a:spcBef>
-              <a:spcAft>
-                <a:spcPts val="0"/>
-              </a:spcAft>
-              <a:buClr>
-                <a:srgbClr val="4C4C51"/>
-              </a:buClr>
-              <a:buSzPts val="1500"/>
-              <a:buChar char="➔"/>
-            </a:pPr>
-            <a:r>
-              <a:rPr lang="en" sz="1500">
-                <a:solidFill>
-                  <a:srgbClr val="4C4C51"/>
-                </a:solidFill>
-              </a:rPr>
-              <a:t>Running and Accessing Docker Containers</a:t>
-            </a:r>
-            <a:endParaRPr sz="1500">
-              <a:solidFill>
-                <a:srgbClr val="4C4C51"/>
-              </a:solidFill>
-            </a:endParaRPr>
-          </a:p>
-          <a:p>
-            <a:pPr indent="-323850" lvl="0" marL="457200" rtl="0" algn="l">
-              <a:spcBef>
-                <a:spcPts val="0"/>
-              </a:spcBef>
-              <a:spcAft>
-                <a:spcPts val="0"/>
-              </a:spcAft>
-              <a:buClr>
-                <a:srgbClr val="4C4C51"/>
-              </a:buClr>
-              <a:buSzPts val="1500"/>
-              <a:buChar char="➔"/>
-            </a:pPr>
-            <a:r>
-              <a:rPr lang="en" sz="1500">
-                <a:solidFill>
-                  <a:srgbClr val="4C4C51"/>
-                </a:solidFill>
-              </a:rPr>
-              <a:t>Viewing Docker Containers Information</a:t>
-            </a:r>
-            <a:endParaRPr sz="1500">
-              <a:solidFill>
-                <a:srgbClr val="4C4C51"/>
-              </a:solidFill>
-            </a:endParaRPr>
-          </a:p>
-          <a:p>
-            <a:pPr indent="-323850" lvl="0" marL="457200" rtl="0" algn="l">
-              <a:spcBef>
-                <a:spcPts val="0"/>
-              </a:spcBef>
-              <a:spcAft>
-                <a:spcPts val="0"/>
-              </a:spcAft>
-              <a:buClr>
-                <a:srgbClr val="4C4C51"/>
-              </a:buClr>
-              <a:buSzPts val="1500"/>
-              <a:buChar char="➔"/>
-            </a:pPr>
-            <a:r>
-              <a:rPr lang="en" sz="1500">
-                <a:solidFill>
-                  <a:srgbClr val="4C4C51"/>
-                </a:solidFill>
-              </a:rPr>
-              <a:t>Checking Docker Logs</a:t>
-            </a:r>
-            <a:endParaRPr sz="1500">
-              <a:solidFill>
-                <a:srgbClr val="4C4C51"/>
-              </a:solidFill>
-            </a:endParaRPr>
-          </a:p>
-          <a:p>
-            <a:pPr indent="-323850" lvl="0" marL="457200" rtl="0" algn="l">
-              <a:spcBef>
-                <a:spcPts val="0"/>
-              </a:spcBef>
-              <a:spcAft>
-                <a:spcPts val="0"/>
-              </a:spcAft>
-              <a:buClr>
-                <a:srgbClr val="4C4C51"/>
-              </a:buClr>
-              <a:buSzPts val="1500"/>
-              <a:buChar char="➔"/>
-            </a:pPr>
-            <a:r>
-              <a:rPr lang="en" sz="1500">
-                <a:solidFill>
-                  <a:srgbClr val="4C4C51"/>
-                </a:solidFill>
-              </a:rPr>
-              <a:t>Login to the containers</a:t>
-            </a:r>
-            <a:endParaRPr sz="1500">
-              <a:solidFill>
-                <a:srgbClr val="4C4C51"/>
-              </a:solidFill>
-            </a:endParaRPr>
-          </a:p>
-          <a:p>
-            <a:pPr indent="-323850" lvl="0" marL="457200" rtl="0" algn="l">
-              <a:spcBef>
-                <a:spcPts val="0"/>
-              </a:spcBef>
-              <a:spcAft>
-                <a:spcPts val="0"/>
-              </a:spcAft>
-              <a:buClr>
-                <a:srgbClr val="4C4C51"/>
-              </a:buClr>
-              <a:buSzPts val="1500"/>
-              <a:buChar char="➔"/>
-            </a:pPr>
-            <a:r>
-              <a:rPr lang="en" sz="1500">
-                <a:solidFill>
-                  <a:srgbClr val="4C4C51"/>
-                </a:solidFill>
-              </a:rPr>
-              <a:t>Copying Data to / from Containers</a:t>
-            </a:r>
-            <a:endParaRPr sz="1500">
-              <a:solidFill>
-                <a:srgbClr val="4C4C51"/>
-              </a:solidFill>
-            </a:endParaRPr>
-          </a:p>
-          <a:p>
-            <a:pPr indent="-323850" lvl="0" marL="457200" rtl="0" algn="l">
-              <a:spcBef>
-                <a:spcPts val="0"/>
-              </a:spcBef>
-              <a:spcAft>
-                <a:spcPts val="0"/>
-              </a:spcAft>
-              <a:buClr>
-                <a:srgbClr val="4C4C51"/>
-              </a:buClr>
-              <a:buSzPts val="1500"/>
-              <a:buChar char="➔"/>
-            </a:pPr>
-            <a:r>
-              <a:rPr lang="en" sz="1500">
-                <a:solidFill>
-                  <a:srgbClr val="4C4C51"/>
-                </a:solidFill>
-              </a:rPr>
-              <a:t>Stop / Restart / Kill Containers</a:t>
-            </a:r>
-            <a:endParaRPr sz="1500">
-              <a:solidFill>
-                <a:srgbClr val="4C4C51"/>
-              </a:solidFill>
-            </a:endParaRPr>
-          </a:p>
-          <a:p>
-            <a:pPr indent="-323850" lvl="0" marL="457200" rtl="0" algn="l">
-              <a:spcBef>
-                <a:spcPts val="0"/>
-              </a:spcBef>
-              <a:spcAft>
-                <a:spcPts val="0"/>
-              </a:spcAft>
-              <a:buClr>
-                <a:srgbClr val="4C4C51"/>
-              </a:buClr>
-              <a:buSzPts val="1500"/>
-              <a:buChar char="➔"/>
-            </a:pPr>
-            <a:r>
-              <a:rPr lang="en" sz="1500">
-                <a:solidFill>
-                  <a:srgbClr val="4C4C51"/>
-                </a:solidFill>
-              </a:rPr>
-              <a:t>Inter Container Communication</a:t>
-            </a:r>
-            <a:endParaRPr sz="1500">
-              <a:solidFill>
-                <a:srgbClr val="4C4C51"/>
-              </a:solidFill>
-            </a:endParaRPr>
-          </a:p>
-          <a:p>
-            <a:pPr indent="-323850" lvl="0" marL="457200" rtl="0" algn="l">
-              <a:spcBef>
-                <a:spcPts val="0"/>
-              </a:spcBef>
-              <a:spcAft>
-                <a:spcPts val="0"/>
-              </a:spcAft>
-              <a:buClr>
-                <a:srgbClr val="4C4C51"/>
-              </a:buClr>
-              <a:buSzPts val="1500"/>
-              <a:buChar char="➔"/>
-            </a:pPr>
-            <a:r>
-              <a:rPr lang="en" sz="1500">
-                <a:solidFill>
-                  <a:srgbClr val="4C4C51"/>
-                </a:solidFill>
-              </a:rPr>
-              <a:t>Restricting Resources and Metrics</a:t>
-            </a:r>
-            <a:endParaRPr sz="1500">
-              <a:solidFill>
-                <a:srgbClr val="4C4C51"/>
-              </a:solidFill>
-            </a:endParaRPr>
-          </a:p>
-          <a:p>
-            <a:pPr indent="-323850" lvl="0" marL="457200" rtl="0" algn="l">
-              <a:spcBef>
-                <a:spcPts val="0"/>
-              </a:spcBef>
-              <a:spcAft>
-                <a:spcPts val="0"/>
-              </a:spcAft>
-              <a:buClr>
-                <a:srgbClr val="4C4C51"/>
-              </a:buClr>
-              <a:buSzPts val="1500"/>
-              <a:buChar char="➔"/>
-            </a:pPr>
-            <a:r>
-              <a:rPr lang="en" sz="1500">
-                <a:solidFill>
-                  <a:srgbClr val="4C4C51"/>
-                </a:solidFill>
-              </a:rPr>
-              <a:t>Sharing namespaces (pid)</a:t>
-            </a:r>
-            <a:endParaRPr sz="1500">
-              <a:solidFill>
-                <a:srgbClr val="4C4C51"/>
-              </a:solidFill>
-            </a:endParaRPr>
-          </a:p>
-          <a:p>
-            <a:pPr indent="-323850" lvl="0" marL="457200" rtl="0" algn="l">
-              <a:spcBef>
-                <a:spcPts val="0"/>
-              </a:spcBef>
-              <a:spcAft>
-                <a:spcPts val="0"/>
-              </a:spcAft>
-              <a:buClr>
-                <a:srgbClr val="4C4C51"/>
-              </a:buClr>
-              <a:buSzPts val="1500"/>
-              <a:buChar char="➔"/>
-            </a:pPr>
-            <a:r>
-              <a:rPr lang="en" sz="1500">
-                <a:solidFill>
-                  <a:srgbClr val="4C4C51"/>
-                </a:solidFill>
-              </a:rPr>
-              <a:t>Persisting Container Data</a:t>
-            </a:r>
-            <a:endParaRPr sz="1500">
-              <a:solidFill>
-                <a:srgbClr val="4C4C51"/>
-              </a:solidFill>
-            </a:endParaRPr>
-          </a:p>
-          <a:p>
-            <a:pPr indent="-323850" lvl="0" marL="457200" rtl="0" algn="l">
-              <a:spcBef>
-                <a:spcPts val="0"/>
-              </a:spcBef>
-              <a:spcAft>
-                <a:spcPts val="0"/>
-              </a:spcAft>
-              <a:buClr>
-                <a:srgbClr val="4C4C51"/>
-              </a:buClr>
-              <a:buSzPts val="1500"/>
-              <a:buChar char="➔"/>
-            </a:pPr>
-            <a:r>
-              <a:rPr lang="en" sz="1500">
-                <a:solidFill>
-                  <a:srgbClr val="4C4C51"/>
-                </a:solidFill>
-              </a:rPr>
-              <a:t>Environment Variables and Files</a:t>
-            </a:r>
-            <a:endParaRPr sz="1500">
-              <a:solidFill>
-                <a:srgbClr val="4C4C51"/>
-              </a:solidFill>
-            </a:endParaRPr>
-          </a:p>
-        </p:txBody>
-      </p:sp>
+      </p:pic>
     </p:spTree>
   </p:cSld>
   <p:clrMapOvr>
@@ -12381,6 +9430,285 @@
 </file>
 
 <file path=ppt/theme/theme1.xml><?xml version="1.0" encoding="utf-8"?>
+<a:theme xmlns:a="http://schemas.openxmlformats.org/drawingml/2006/main" xmlns:r="http://schemas.openxmlformats.org/officeDocument/2006/relationships" name="Paradigm">
+  <a:themeElements>
+    <a:clrScheme name="Paradigm">
+      <a:dk1>
+        <a:srgbClr val="31394D"/>
+      </a:dk1>
+      <a:lt1>
+        <a:srgbClr val="FFFFFF"/>
+      </a:lt1>
+      <a:dk2>
+        <a:srgbClr val="666666"/>
+      </a:dk2>
+      <a:lt2>
+        <a:srgbClr val="626B73"/>
+      </a:lt2>
+      <a:accent1>
+        <a:srgbClr val="002F4A"/>
+      </a:accent1>
+      <a:accent2>
+        <a:srgbClr val="D9C4B1"/>
+      </a:accent2>
+      <a:accent3>
+        <a:srgbClr val="EDE3DA"/>
+      </a:accent3>
+      <a:accent4>
+        <a:srgbClr val="B85741"/>
+      </a:accent4>
+      <a:accent5>
+        <a:srgbClr val="009384"/>
+      </a:accent5>
+      <a:accent6>
+        <a:srgbClr val="D0F6FF"/>
+      </a:accent6>
+      <a:hlink>
+        <a:srgbClr val="009384"/>
+      </a:hlink>
+      <a:folHlink>
+        <a:srgbClr val="009384"/>
+      </a:folHlink>
+    </a:clrScheme>
+    <a:fontScheme name="Office">
+      <a:majorFont>
+        <a:latin typeface="Arial"/>
+        <a:ea typeface=""/>
+        <a:cs typeface=""/>
+        <a:font script="Jpan" typeface="ＭＳ Ｐゴシック"/>
+        <a:font script="Hang" typeface="맑은 고딕"/>
+        <a:font script="Hans" typeface="宋体"/>
+        <a:font script="Hant" typeface="新細明體"/>
+        <a:font script="Arab" typeface="Times New Roman"/>
+        <a:font script="Hebr" typeface="Times New Roman"/>
+        <a:font script="Thai" typeface="Angsana New"/>
+        <a:font script="Ethi" typeface="Nyala"/>
+        <a:font script="Beng" typeface="Vrinda"/>
+        <a:font script="Gujr" typeface="Shruti"/>
+        <a:font script="Khmr" typeface="MoolBoran"/>
+        <a:font script="Knda" typeface="Tunga"/>
+        <a:font script="Guru" typeface="Raavi"/>
+        <a:font script="Cans" typeface="Euphemia"/>
+        <a:font script="Cher" typeface="Plantagenet Cherokee"/>
+        <a:font script="Yiii" typeface="Microsoft Yi Baiti"/>
+        <a:font script="Tibt" typeface="Microsoft Himalaya"/>
+        <a:font script="Thaa" typeface="MV Boli"/>
+        <a:font script="Deva" typeface="Mangal"/>
+        <a:font script="Telu" typeface="Gautami"/>
+        <a:font script="Taml" typeface="Latha"/>
+        <a:font script="Syrc" typeface="Estrangelo Edessa"/>
+        <a:font script="Orya" typeface="Kalinga"/>
+        <a:font script="Mlym" typeface="Kartika"/>
+        <a:font script="Laoo" typeface="DokChampa"/>
+        <a:font script="Sinh" typeface="Iskoola Pota"/>
+        <a:font script="Mong" typeface="Mongolian Baiti"/>
+        <a:font script="Viet" typeface="Times New Roman"/>
+        <a:font script="Uigh" typeface="Microsoft Uighur"/>
+        <a:font script="Geor" typeface="Sylfaen"/>
+      </a:majorFont>
+      <a:minorFont>
+        <a:latin typeface="Arial"/>
+        <a:ea typeface=""/>
+        <a:cs typeface=""/>
+        <a:font script="Jpan" typeface="ＭＳ Ｐゴシック"/>
+        <a:font script="Hang" typeface="맑은 고딕"/>
+        <a:font script="Hans" typeface="宋体"/>
+        <a:font script="Hant" typeface="新細明體"/>
+        <a:font script="Arab" typeface="Arial"/>
+        <a:font script="Hebr" typeface="Arial"/>
+        <a:font script="Thai" typeface="Cordia New"/>
+        <a:font script="Ethi" typeface="Nyala"/>
+        <a:font script="Beng" typeface="Vrinda"/>
+        <a:font script="Gujr" typeface="Shruti"/>
+        <a:font script="Khmr" typeface="DaunPenh"/>
+        <a:font script="Knda" typeface="Tunga"/>
+        <a:font script="Guru" typeface="Raavi"/>
+        <a:font script="Cans" typeface="Euphemia"/>
+        <a:font script="Cher" typeface="Plantagenet Cherokee"/>
+        <a:font script="Yiii" typeface="Microsoft Yi Baiti"/>
+        <a:font script="Tibt" typeface="Microsoft Himalaya"/>
+        <a:font script="Thaa" typeface="MV Boli"/>
+        <a:font script="Deva" typeface="Mangal"/>
+        <a:font script="Telu" typeface="Gautami"/>
+        <a:font script="Taml" typeface="Latha"/>
+        <a:font script="Syrc" typeface="Estrangelo Edessa"/>
+        <a:font script="Orya" typeface="Kalinga"/>
+        <a:font script="Mlym" typeface="Kartika"/>
+        <a:font script="Laoo" typeface="DokChampa"/>
+        <a:font script="Sinh" typeface="Iskoola Pota"/>
+        <a:font script="Mong" typeface="Mongolian Baiti"/>
+        <a:font script="Viet" typeface="Arial"/>
+        <a:font script="Uigh" typeface="Microsoft Uighur"/>
+        <a:font script="Geor" typeface="Sylfaen"/>
+      </a:minorFont>
+    </a:fontScheme>
+    <a:fmtScheme name="Office">
+      <a:fillStyleLst>
+        <a:solidFill>
+          <a:schemeClr val="phClr"/>
+        </a:solidFill>
+        <a:gradFill rotWithShape="1">
+          <a:gsLst>
+            <a:gs pos="0">
+              <a:schemeClr val="phClr">
+                <a:tint val="50000"/>
+                <a:satMod val="300000"/>
+              </a:schemeClr>
+            </a:gs>
+            <a:gs pos="35000">
+              <a:schemeClr val="phClr">
+                <a:tint val="37000"/>
+                <a:satMod val="300000"/>
+              </a:schemeClr>
+            </a:gs>
+            <a:gs pos="100000">
+              <a:schemeClr val="phClr">
+                <a:tint val="15000"/>
+                <a:satMod val="350000"/>
+              </a:schemeClr>
+            </a:gs>
+          </a:gsLst>
+          <a:lin ang="16200000" scaled="1"/>
+        </a:gradFill>
+        <a:gradFill rotWithShape="1">
+          <a:gsLst>
+            <a:gs pos="0">
+              <a:schemeClr val="phClr">
+                <a:tint val="100000"/>
+                <a:shade val="100000"/>
+                <a:satMod val="130000"/>
+              </a:schemeClr>
+            </a:gs>
+            <a:gs pos="100000">
+              <a:schemeClr val="phClr">
+                <a:tint val="50000"/>
+                <a:shade val="100000"/>
+                <a:satMod val="350000"/>
+              </a:schemeClr>
+            </a:gs>
+          </a:gsLst>
+          <a:lin ang="16200000" scaled="0"/>
+        </a:gradFill>
+      </a:fillStyleLst>
+      <a:lnStyleLst>
+        <a:ln w="9525" cap="flat" cmpd="sng" algn="ctr">
+          <a:solidFill>
+            <a:schemeClr val="phClr">
+              <a:shade val="95000"/>
+              <a:satMod val="105000"/>
+            </a:schemeClr>
+          </a:solidFill>
+          <a:prstDash val="solid"/>
+        </a:ln>
+        <a:ln w="25400" cap="flat" cmpd="sng" algn="ctr">
+          <a:solidFill>
+            <a:schemeClr val="phClr"/>
+          </a:solidFill>
+          <a:prstDash val="solid"/>
+        </a:ln>
+        <a:ln w="38100" cap="flat" cmpd="sng" algn="ctr">
+          <a:solidFill>
+            <a:schemeClr val="phClr"/>
+          </a:solidFill>
+          <a:prstDash val="solid"/>
+        </a:ln>
+      </a:lnStyleLst>
+      <a:effectStyleLst>
+        <a:effectStyle>
+          <a:effectLst>
+            <a:outerShdw blurRad="40000" dist="20000" dir="5400000" rotWithShape="0">
+              <a:srgbClr val="000000">
+                <a:alpha val="38000"/>
+              </a:srgbClr>
+            </a:outerShdw>
+          </a:effectLst>
+        </a:effectStyle>
+        <a:effectStyle>
+          <a:effectLst>
+            <a:outerShdw blurRad="40000" dist="23000" dir="5400000" rotWithShape="0">
+              <a:srgbClr val="000000">
+                <a:alpha val="35000"/>
+              </a:srgbClr>
+            </a:outerShdw>
+          </a:effectLst>
+        </a:effectStyle>
+        <a:effectStyle>
+          <a:effectLst>
+            <a:outerShdw blurRad="40000" dist="23000" dir="5400000" rotWithShape="0">
+              <a:srgbClr val="000000">
+                <a:alpha val="35000"/>
+              </a:srgbClr>
+            </a:outerShdw>
+          </a:effectLst>
+          <a:scene3d>
+            <a:camera prst="orthographicFront">
+              <a:rot lat="0" lon="0" rev="0"/>
+            </a:camera>
+            <a:lightRig rig="threePt" dir="t">
+              <a:rot lat="0" lon="0" rev="1200000"/>
+            </a:lightRig>
+          </a:scene3d>
+          <a:sp3d>
+            <a:bevelT w="63500" h="25400"/>
+          </a:sp3d>
+        </a:effectStyle>
+      </a:effectStyleLst>
+      <a:bgFillStyleLst>
+        <a:solidFill>
+          <a:schemeClr val="phClr"/>
+        </a:solidFill>
+        <a:gradFill rotWithShape="1">
+          <a:gsLst>
+            <a:gs pos="0">
+              <a:schemeClr val="phClr">
+                <a:tint val="40000"/>
+                <a:satMod val="350000"/>
+              </a:schemeClr>
+            </a:gs>
+            <a:gs pos="40000">
+              <a:schemeClr val="phClr">
+                <a:tint val="45000"/>
+                <a:shade val="99000"/>
+                <a:satMod val="350000"/>
+              </a:schemeClr>
+            </a:gs>
+            <a:gs pos="100000">
+              <a:schemeClr val="phClr">
+                <a:shade val="20000"/>
+                <a:satMod val="255000"/>
+              </a:schemeClr>
+            </a:gs>
+          </a:gsLst>
+          <a:path path="circle">
+            <a:fillToRect l="50000" t="-80000" r="50000" b="180000"/>
+          </a:path>
+        </a:gradFill>
+        <a:gradFill rotWithShape="1">
+          <a:gsLst>
+            <a:gs pos="0">
+              <a:schemeClr val="phClr">
+                <a:tint val="80000"/>
+                <a:satMod val="300000"/>
+              </a:schemeClr>
+            </a:gs>
+            <a:gs pos="100000">
+              <a:schemeClr val="phClr">
+                <a:shade val="30000"/>
+                <a:satMod val="200000"/>
+              </a:schemeClr>
+            </a:gs>
+          </a:gsLst>
+          <a:path path="circle">
+            <a:fillToRect l="50000" t="50000" r="50000" b="50000"/>
+          </a:path>
+        </a:gradFill>
+      </a:bgFillStyleLst>
+    </a:fmtScheme>
+  </a:themeElements>
+</a:theme>
+</file>
+
+<file path=ppt/theme/theme2.xml><?xml version="1.0" encoding="utf-8"?>
 <a:theme xmlns:a="http://schemas.openxmlformats.org/drawingml/2006/main" xmlns:r="http://schemas.openxmlformats.org/officeDocument/2006/relationships">
   <a:themeElements>
     <a:clrScheme name="Default">
@@ -12657,283 +9985,4 @@
     </a:fmtScheme>
   </a:themeElements>
 </a:theme>
-</file>
-
-<file path=ppt/theme/theme2.xml><?xml version="1.0" encoding="utf-8"?>
-<a:theme xmlns:a="http://schemas.openxmlformats.org/drawingml/2006/main" xmlns:r="http://schemas.openxmlformats.org/officeDocument/2006/relationships" name="Paradigm">
-  <a:themeElements>
-    <a:clrScheme name="Paradigm">
-      <a:dk1>
-        <a:srgbClr val="31394D"/>
-      </a:dk1>
-      <a:lt1>
-        <a:srgbClr val="FFFFFF"/>
-      </a:lt1>
-      <a:dk2>
-        <a:srgbClr val="666666"/>
-      </a:dk2>
-      <a:lt2>
-        <a:srgbClr val="626B73"/>
-      </a:lt2>
-      <a:accent1>
-        <a:srgbClr val="002F4A"/>
-      </a:accent1>
-      <a:accent2>
-        <a:srgbClr val="D9C4B1"/>
-      </a:accent2>
-      <a:accent3>
-        <a:srgbClr val="EDE3DA"/>
-      </a:accent3>
-      <a:accent4>
-        <a:srgbClr val="B85741"/>
-      </a:accent4>
-      <a:accent5>
-        <a:srgbClr val="009384"/>
-      </a:accent5>
-      <a:accent6>
-        <a:srgbClr val="D0F6FF"/>
-      </a:accent6>
-      <a:hlink>
-        <a:srgbClr val="009384"/>
-      </a:hlink>
-      <a:folHlink>
-        <a:srgbClr val="009384"/>
-      </a:folHlink>
-    </a:clrScheme>
-    <a:fontScheme name="Office">
-      <a:majorFont>
-        <a:latin typeface="Arial"/>
-        <a:ea typeface=""/>
-        <a:cs typeface=""/>
-        <a:font script="Jpan" typeface="ＭＳ Ｐゴシック"/>
-        <a:font script="Hang" typeface="맑은 고딕"/>
-        <a:font script="Hans" typeface="宋体"/>
-        <a:font script="Hant" typeface="新細明體"/>
-        <a:font script="Arab" typeface="Times New Roman"/>
-        <a:font script="Hebr" typeface="Times New Roman"/>
-        <a:font script="Thai" typeface="Angsana New"/>
-        <a:font script="Ethi" typeface="Nyala"/>
-        <a:font script="Beng" typeface="Vrinda"/>
-        <a:font script="Gujr" typeface="Shruti"/>
-        <a:font script="Khmr" typeface="MoolBoran"/>
-        <a:font script="Knda" typeface="Tunga"/>
-        <a:font script="Guru" typeface="Raavi"/>
-        <a:font script="Cans" typeface="Euphemia"/>
-        <a:font script="Cher" typeface="Plantagenet Cherokee"/>
-        <a:font script="Yiii" typeface="Microsoft Yi Baiti"/>
-        <a:font script="Tibt" typeface="Microsoft Himalaya"/>
-        <a:font script="Thaa" typeface="MV Boli"/>
-        <a:font script="Deva" typeface="Mangal"/>
-        <a:font script="Telu" typeface="Gautami"/>
-        <a:font script="Taml" typeface="Latha"/>
-        <a:font script="Syrc" typeface="Estrangelo Edessa"/>
-        <a:font script="Orya" typeface="Kalinga"/>
-        <a:font script="Mlym" typeface="Kartika"/>
-        <a:font script="Laoo" typeface="DokChampa"/>
-        <a:font script="Sinh" typeface="Iskoola Pota"/>
-        <a:font script="Mong" typeface="Mongolian Baiti"/>
-        <a:font script="Viet" typeface="Times New Roman"/>
-        <a:font script="Uigh" typeface="Microsoft Uighur"/>
-        <a:font script="Geor" typeface="Sylfaen"/>
-      </a:majorFont>
-      <a:minorFont>
-        <a:latin typeface="Arial"/>
-        <a:ea typeface=""/>
-        <a:cs typeface=""/>
-        <a:font script="Jpan" typeface="ＭＳ Ｐゴシック"/>
-        <a:font script="Hang" typeface="맑은 고딕"/>
-        <a:font script="Hans" typeface="宋体"/>
-        <a:font script="Hant" typeface="新細明體"/>
-        <a:font script="Arab" typeface="Arial"/>
-        <a:font script="Hebr" typeface="Arial"/>
-        <a:font script="Thai" typeface="Cordia New"/>
-        <a:font script="Ethi" typeface="Nyala"/>
-        <a:font script="Beng" typeface="Vrinda"/>
-        <a:font script="Gujr" typeface="Shruti"/>
-        <a:font script="Khmr" typeface="DaunPenh"/>
-        <a:font script="Knda" typeface="Tunga"/>
-        <a:font script="Guru" typeface="Raavi"/>
-        <a:font script="Cans" typeface="Euphemia"/>
-        <a:font script="Cher" typeface="Plantagenet Cherokee"/>
-        <a:font script="Yiii" typeface="Microsoft Yi Baiti"/>
-        <a:font script="Tibt" typeface="Microsoft Himalaya"/>
-        <a:font script="Thaa" typeface="MV Boli"/>
-        <a:font script="Deva" typeface="Mangal"/>
-        <a:font script="Telu" typeface="Gautami"/>
-        <a:font script="Taml" typeface="Latha"/>
-        <a:font script="Syrc" typeface="Estrangelo Edessa"/>
-        <a:font script="Orya" typeface="Kalinga"/>
-        <a:font script="Mlym" typeface="Kartika"/>
-        <a:font script="Laoo" typeface="DokChampa"/>
-        <a:font script="Sinh" typeface="Iskoola Pota"/>
-        <a:font script="Mong" typeface="Mongolian Baiti"/>
-        <a:font script="Viet" typeface="Arial"/>
-        <a:font script="Uigh" typeface="Microsoft Uighur"/>
-        <a:font script="Geor" typeface="Sylfaen"/>
-      </a:minorFont>
-    </a:fontScheme>
-    <a:fmtScheme name="Office">
-      <a:fillStyleLst>
-        <a:solidFill>
-          <a:schemeClr val="phClr"/>
-        </a:solidFill>
-        <a:gradFill rotWithShape="1">
-          <a:gsLst>
-            <a:gs pos="0">
-              <a:schemeClr val="phClr">
-                <a:tint val="50000"/>
-                <a:satMod val="300000"/>
-              </a:schemeClr>
-            </a:gs>
-            <a:gs pos="35000">
-              <a:schemeClr val="phClr">
-                <a:tint val="37000"/>
-                <a:satMod val="300000"/>
-              </a:schemeClr>
-            </a:gs>
-            <a:gs pos="100000">
-              <a:schemeClr val="phClr">
-                <a:tint val="15000"/>
-                <a:satMod val="350000"/>
-              </a:schemeClr>
-            </a:gs>
-          </a:gsLst>
-          <a:lin ang="16200000" scaled="1"/>
-        </a:gradFill>
-        <a:gradFill rotWithShape="1">
-          <a:gsLst>
-            <a:gs pos="0">
-              <a:schemeClr val="phClr">
-                <a:tint val="100000"/>
-                <a:shade val="100000"/>
-                <a:satMod val="130000"/>
-              </a:schemeClr>
-            </a:gs>
-            <a:gs pos="100000">
-              <a:schemeClr val="phClr">
-                <a:tint val="50000"/>
-                <a:shade val="100000"/>
-                <a:satMod val="350000"/>
-              </a:schemeClr>
-            </a:gs>
-          </a:gsLst>
-          <a:lin ang="16200000" scaled="0"/>
-        </a:gradFill>
-      </a:fillStyleLst>
-      <a:lnStyleLst>
-        <a:ln w="9525" cap="flat" cmpd="sng" algn="ctr">
-          <a:solidFill>
-            <a:schemeClr val="phClr">
-              <a:shade val="95000"/>
-              <a:satMod val="105000"/>
-            </a:schemeClr>
-          </a:solidFill>
-          <a:prstDash val="solid"/>
-        </a:ln>
-        <a:ln w="25400" cap="flat" cmpd="sng" algn="ctr">
-          <a:solidFill>
-            <a:schemeClr val="phClr"/>
-          </a:solidFill>
-          <a:prstDash val="solid"/>
-        </a:ln>
-        <a:ln w="38100" cap="flat" cmpd="sng" algn="ctr">
-          <a:solidFill>
-            <a:schemeClr val="phClr"/>
-          </a:solidFill>
-          <a:prstDash val="solid"/>
-        </a:ln>
-      </a:lnStyleLst>
-      <a:effectStyleLst>
-        <a:effectStyle>
-          <a:effectLst>
-            <a:outerShdw blurRad="40000" dist="20000" dir="5400000" rotWithShape="0">
-              <a:srgbClr val="000000">
-                <a:alpha val="38000"/>
-              </a:srgbClr>
-            </a:outerShdw>
-          </a:effectLst>
-        </a:effectStyle>
-        <a:effectStyle>
-          <a:effectLst>
-            <a:outerShdw blurRad="40000" dist="23000" dir="5400000" rotWithShape="0">
-              <a:srgbClr val="000000">
-                <a:alpha val="35000"/>
-              </a:srgbClr>
-            </a:outerShdw>
-          </a:effectLst>
-        </a:effectStyle>
-        <a:effectStyle>
-          <a:effectLst>
-            <a:outerShdw blurRad="40000" dist="23000" dir="5400000" rotWithShape="0">
-              <a:srgbClr val="000000">
-                <a:alpha val="35000"/>
-              </a:srgbClr>
-            </a:outerShdw>
-          </a:effectLst>
-          <a:scene3d>
-            <a:camera prst="orthographicFront">
-              <a:rot lat="0" lon="0" rev="0"/>
-            </a:camera>
-            <a:lightRig rig="threePt" dir="t">
-              <a:rot lat="0" lon="0" rev="1200000"/>
-            </a:lightRig>
-          </a:scene3d>
-          <a:sp3d>
-            <a:bevelT w="63500" h="25400"/>
-          </a:sp3d>
-        </a:effectStyle>
-      </a:effectStyleLst>
-      <a:bgFillStyleLst>
-        <a:solidFill>
-          <a:schemeClr val="phClr"/>
-        </a:solidFill>
-        <a:gradFill rotWithShape="1">
-          <a:gsLst>
-            <a:gs pos="0">
-              <a:schemeClr val="phClr">
-                <a:tint val="40000"/>
-                <a:satMod val="350000"/>
-              </a:schemeClr>
-            </a:gs>
-            <a:gs pos="40000">
-              <a:schemeClr val="phClr">
-                <a:tint val="45000"/>
-                <a:shade val="99000"/>
-                <a:satMod val="350000"/>
-              </a:schemeClr>
-            </a:gs>
-            <a:gs pos="100000">
-              <a:schemeClr val="phClr">
-                <a:shade val="20000"/>
-                <a:satMod val="255000"/>
-              </a:schemeClr>
-            </a:gs>
-          </a:gsLst>
-          <a:path path="circle">
-            <a:fillToRect l="50000" t="-80000" r="50000" b="180000"/>
-          </a:path>
-        </a:gradFill>
-        <a:gradFill rotWithShape="1">
-          <a:gsLst>
-            <a:gs pos="0">
-              <a:schemeClr val="phClr">
-                <a:tint val="80000"/>
-                <a:satMod val="300000"/>
-              </a:schemeClr>
-            </a:gs>
-            <a:gs pos="100000">
-              <a:schemeClr val="phClr">
-                <a:shade val="30000"/>
-                <a:satMod val="200000"/>
-              </a:schemeClr>
-            </a:gs>
-          </a:gsLst>
-          <a:path path="circle">
-            <a:fillToRect l="50000" t="50000" r="50000" b="50000"/>
-          </a:path>
-        </a:gradFill>
-      </a:bgFillStyleLst>
-    </a:fmtScheme>
-  </a:themeElements>
-</a:theme>
 </file>
</xml_diff>